<commit_message>
Lecture 04 ready for delivery
</commit_message>
<xml_diff>
--- a/Slides/Lesson 8.3 Binary Search.pptx
+++ b/Slides/Lesson 8.3 Binary Search.pptx
@@ -2,28 +2,28 @@
 <file path=ppt/presentation.xml><?xml version="1.0" encoding="utf-8"?>
 <p:presentation xmlns:a="http://schemas.openxmlformats.org/drawingml/2006/main" xmlns:r="http://schemas.openxmlformats.org/officeDocument/2006/relationships" xmlns:p="http://schemas.openxmlformats.org/presentationml/2006/main" saveSubsetFonts="1">
   <p:sldMasterIdLst>
-    <p:sldMasterId id="2147483648" r:id="rId1"/>
+    <p:sldMasterId id="2147483660" r:id="rId1"/>
   </p:sldMasterIdLst>
   <p:notesMasterIdLst>
     <p:notesMasterId r:id="rId18"/>
   </p:notesMasterIdLst>
   <p:sldIdLst>
-    <p:sldId id="257" r:id="rId2"/>
-    <p:sldId id="265" r:id="rId3"/>
-    <p:sldId id="325" r:id="rId4"/>
-    <p:sldId id="338" r:id="rId5"/>
-    <p:sldId id="340" r:id="rId6"/>
-    <p:sldId id="341" r:id="rId7"/>
-    <p:sldId id="342" r:id="rId8"/>
-    <p:sldId id="343" r:id="rId9"/>
-    <p:sldId id="344" r:id="rId10"/>
-    <p:sldId id="345" r:id="rId11"/>
-    <p:sldId id="346" r:id="rId12"/>
-    <p:sldId id="347" r:id="rId13"/>
-    <p:sldId id="350" r:id="rId14"/>
-    <p:sldId id="348" r:id="rId15"/>
-    <p:sldId id="349" r:id="rId16"/>
-    <p:sldId id="337" r:id="rId17"/>
+    <p:sldId id="358" r:id="rId2"/>
+    <p:sldId id="359" r:id="rId3"/>
+    <p:sldId id="360" r:id="rId4"/>
+    <p:sldId id="361" r:id="rId5"/>
+    <p:sldId id="362" r:id="rId6"/>
+    <p:sldId id="363" r:id="rId7"/>
+    <p:sldId id="364" r:id="rId8"/>
+    <p:sldId id="365" r:id="rId9"/>
+    <p:sldId id="366" r:id="rId10"/>
+    <p:sldId id="367" r:id="rId11"/>
+    <p:sldId id="368" r:id="rId12"/>
+    <p:sldId id="369" r:id="rId13"/>
+    <p:sldId id="370" r:id="rId14"/>
+    <p:sldId id="371" r:id="rId15"/>
+    <p:sldId id="372" r:id="rId16"/>
+    <p:sldId id="373" r:id="rId17"/>
   </p:sldIdLst>
   <p:sldSz cx="9144000" cy="6858000" type="screen4x3"/>
   <p:notesSz cx="6858000" cy="9144000"/>
@@ -241,7 +241,7 @@
             <a:fld id="{CF8F25F6-E1EF-4065-8525-42EDEBD9BD22}" type="datetimeFigureOut">
               <a:rPr lang="en-US" smtClean="0"/>
               <a:pPr/>
-              <a:t>10/19/2014</a:t>
+              <a:t>10/5/2015</a:t>
             </a:fld>
             <a:endParaRPr lang="en-US"/>
           </a:p>
@@ -412,7 +412,7 @@
     </p:spTree>
     <p:extLst>
       <p:ext uri="{BB962C8B-B14F-4D97-AF65-F5344CB8AC3E}">
-        <p14:creationId xmlns:p14="http://schemas.microsoft.com/office/powerpoint/2010/main" val="2128575168"/>
+        <p14:creationId xmlns:p14="http://schemas.microsoft.com/office/powerpoint/2010/main" val="1260049746"/>
       </p:ext>
     </p:extLst>
   </p:cSld>
@@ -589,7 +589,7 @@
     </p:spTree>
     <p:extLst>
       <p:ext uri="{BB962C8B-B14F-4D97-AF65-F5344CB8AC3E}">
-        <p14:creationId xmlns:p14="http://schemas.microsoft.com/office/powerpoint/2010/main" val="3643026010"/>
+        <p14:creationId xmlns:p14="http://schemas.microsoft.com/office/powerpoint/2010/main" val="692669945"/>
       </p:ext>
     </p:extLst>
   </p:cSld>
@@ -778,9 +778,9 @@
           <a:bodyPr/>
           <a:lstStyle/>
           <a:p>
-            <a:fld id="{8DA1BB7F-B88E-427C-AE5B-DC3AB4E9C6A2}" type="datetime1">
-              <a:rPr lang="en-US" smtClean="0"/>
-              <a:t>10/19/2014</a:t>
+            <a:fld id="{2F1F79F5-7BEC-496A-AFC7-876E38F64D71}" type="datetime1">
+              <a:rPr lang="en-US" smtClean="0"/>
+              <a:t>10/5/2015</a:t>
             </a:fld>
             <a:endParaRPr lang="en-US"/>
           </a:p>
@@ -820,9 +820,8 @@
           <a:bodyPr/>
           <a:lstStyle/>
           <a:p>
-            <a:fld id="{9F4492BD-6A9C-48FC-AC76-0B4FE11194A1}" type="slidenum">
-              <a:rPr lang="en-US" smtClean="0"/>
-              <a:pPr/>
+            <a:fld id="{2AF3B5EA-18B6-4040-9F78-6052AF49C681}" type="slidenum">
+              <a:rPr lang="en-US" smtClean="0"/>
               <a:t>‹#›</a:t>
             </a:fld>
             <a:endParaRPr lang="en-US"/>
@@ -830,6 +829,11 @@
         </p:txBody>
       </p:sp>
     </p:spTree>
+    <p:extLst>
+      <p:ext uri="{BB962C8B-B14F-4D97-AF65-F5344CB8AC3E}">
+        <p14:creationId xmlns:p14="http://schemas.microsoft.com/office/powerpoint/2010/main" val="2418005282"/>
+      </p:ext>
+    </p:extLst>
   </p:cSld>
   <p:clrMapOvr>
     <a:masterClrMapping/>
@@ -845,6 +849,378 @@
 </file>
 
 <file path=ppt/slideLayouts/slideLayout10.xml><?xml version="1.0" encoding="utf-8"?>
+<p:sldLayout xmlns:a="http://schemas.openxmlformats.org/drawingml/2006/main" xmlns:r="http://schemas.openxmlformats.org/officeDocument/2006/relationships" xmlns:p="http://schemas.openxmlformats.org/presentationml/2006/main" type="blank" preserve="1">
+  <p:cSld name="Blank">
+    <p:spTree>
+      <p:nvGrpSpPr>
+        <p:cNvPr id="1" name=""/>
+        <p:cNvGrpSpPr/>
+        <p:nvPr/>
+      </p:nvGrpSpPr>
+      <p:grpSpPr>
+        <a:xfrm>
+          <a:off x="0" y="0"/>
+          <a:ext cx="0" cy="0"/>
+          <a:chOff x="0" y="0"/>
+          <a:chExt cx="0" cy="0"/>
+        </a:xfrm>
+      </p:grpSpPr>
+      <p:sp>
+        <p:nvSpPr>
+          <p:cNvPr id="2" name="Date Placeholder 1"/>
+          <p:cNvSpPr>
+            <a:spLocks noGrp="1"/>
+          </p:cNvSpPr>
+          <p:nvPr>
+            <p:ph type="dt" sz="half" idx="10"/>
+          </p:nvPr>
+        </p:nvSpPr>
+        <p:spPr/>
+        <p:txBody>
+          <a:bodyPr/>
+          <a:lstStyle/>
+          <a:p>
+            <a:fld id="{0A05703A-7669-4FEA-9056-25299B4D29D4}" type="datetime1">
+              <a:rPr lang="en-US" smtClean="0"/>
+              <a:t>10/5/2015</a:t>
+            </a:fld>
+            <a:endParaRPr lang="en-US"/>
+          </a:p>
+        </p:txBody>
+      </p:sp>
+      <p:sp>
+        <p:nvSpPr>
+          <p:cNvPr id="3" name="Footer Placeholder 2"/>
+          <p:cNvSpPr>
+            <a:spLocks noGrp="1"/>
+          </p:cNvSpPr>
+          <p:nvPr>
+            <p:ph type="ftr" sz="quarter" idx="11"/>
+          </p:nvPr>
+        </p:nvSpPr>
+        <p:spPr/>
+        <p:txBody>
+          <a:bodyPr/>
+          <a:lstStyle/>
+          <a:p>
+            <a:endParaRPr lang="en-US"/>
+          </a:p>
+        </p:txBody>
+      </p:sp>
+      <p:sp>
+        <p:nvSpPr>
+          <p:cNvPr id="4" name="Slide Number Placeholder 3"/>
+          <p:cNvSpPr>
+            <a:spLocks noGrp="1"/>
+          </p:cNvSpPr>
+          <p:nvPr>
+            <p:ph type="sldNum" sz="quarter" idx="12"/>
+          </p:nvPr>
+        </p:nvSpPr>
+        <p:spPr/>
+        <p:txBody>
+          <a:bodyPr/>
+          <a:lstStyle/>
+          <a:p>
+            <a:fld id="{2AF3B5EA-18B6-4040-9F78-6052AF49C681}" type="slidenum">
+              <a:rPr lang="en-US" smtClean="0"/>
+              <a:t>‹#›</a:t>
+            </a:fld>
+            <a:endParaRPr lang="en-US"/>
+          </a:p>
+        </p:txBody>
+      </p:sp>
+    </p:spTree>
+    <p:extLst>
+      <p:ext uri="{BB962C8B-B14F-4D97-AF65-F5344CB8AC3E}">
+        <p14:creationId xmlns:p14="http://schemas.microsoft.com/office/powerpoint/2010/main" val="1832862371"/>
+      </p:ext>
+    </p:extLst>
+  </p:cSld>
+  <p:clrMapOvr>
+    <a:masterClrMapping/>
+  </p:clrMapOvr>
+</p:sldLayout>
+</file>
+
+<file path=ppt/slideLayouts/slideLayout11.xml><?xml version="1.0" encoding="utf-8"?>
+<p:sldLayout xmlns:a="http://schemas.openxmlformats.org/drawingml/2006/main" xmlns:r="http://schemas.openxmlformats.org/officeDocument/2006/relationships" xmlns:p="http://schemas.openxmlformats.org/presentationml/2006/main" type="objTx" preserve="1">
+  <p:cSld name="Content with Caption">
+    <p:spTree>
+      <p:nvGrpSpPr>
+        <p:cNvPr id="1" name=""/>
+        <p:cNvGrpSpPr/>
+        <p:nvPr/>
+      </p:nvGrpSpPr>
+      <p:grpSpPr>
+        <a:xfrm>
+          <a:off x="0" y="0"/>
+          <a:ext cx="0" cy="0"/>
+          <a:chOff x="0" y="0"/>
+          <a:chExt cx="0" cy="0"/>
+        </a:xfrm>
+      </p:grpSpPr>
+      <p:sp>
+        <p:nvSpPr>
+          <p:cNvPr id="2" name="Title 1"/>
+          <p:cNvSpPr>
+            <a:spLocks noGrp="1"/>
+          </p:cNvSpPr>
+          <p:nvPr>
+            <p:ph type="title"/>
+          </p:nvPr>
+        </p:nvSpPr>
+        <p:spPr>
+          <a:xfrm>
+            <a:off x="457200" y="273050"/>
+            <a:ext cx="3008313" cy="1162050"/>
+          </a:xfrm>
+        </p:spPr>
+        <p:txBody>
+          <a:bodyPr anchor="b"/>
+          <a:lstStyle>
+            <a:lvl1pPr algn="l">
+              <a:defRPr sz="2000" b="1"/>
+            </a:lvl1pPr>
+          </a:lstStyle>
+          <a:p>
+            <a:r>
+              <a:rPr lang="en-US" smtClean="0"/>
+              <a:t>Click to edit Master title style</a:t>
+            </a:r>
+            <a:endParaRPr lang="en-US"/>
+          </a:p>
+        </p:txBody>
+      </p:sp>
+      <p:sp>
+        <p:nvSpPr>
+          <p:cNvPr id="3" name="Content Placeholder 2"/>
+          <p:cNvSpPr>
+            <a:spLocks noGrp="1"/>
+          </p:cNvSpPr>
+          <p:nvPr>
+            <p:ph idx="1"/>
+          </p:nvPr>
+        </p:nvSpPr>
+        <p:spPr>
+          <a:xfrm>
+            <a:off x="3575050" y="273050"/>
+            <a:ext cx="5111750" cy="5853113"/>
+          </a:xfrm>
+        </p:spPr>
+        <p:txBody>
+          <a:bodyPr/>
+          <a:lstStyle>
+            <a:lvl1pPr>
+              <a:defRPr sz="3200"/>
+            </a:lvl1pPr>
+            <a:lvl2pPr>
+              <a:defRPr sz="2800"/>
+            </a:lvl2pPr>
+            <a:lvl3pPr>
+              <a:defRPr sz="2400"/>
+            </a:lvl3pPr>
+            <a:lvl4pPr>
+              <a:defRPr sz="2000"/>
+            </a:lvl4pPr>
+            <a:lvl5pPr>
+              <a:defRPr sz="2000"/>
+            </a:lvl5pPr>
+            <a:lvl6pPr>
+              <a:defRPr sz="2000"/>
+            </a:lvl6pPr>
+            <a:lvl7pPr>
+              <a:defRPr sz="2000"/>
+            </a:lvl7pPr>
+            <a:lvl8pPr>
+              <a:defRPr sz="2000"/>
+            </a:lvl8pPr>
+            <a:lvl9pPr>
+              <a:defRPr sz="2000"/>
+            </a:lvl9pPr>
+          </a:lstStyle>
+          <a:p>
+            <a:pPr lvl="0"/>
+            <a:r>
+              <a:rPr lang="en-US" smtClean="0"/>
+              <a:t>Click to edit Master text styles</a:t>
+            </a:r>
+          </a:p>
+          <a:p>
+            <a:pPr lvl="1"/>
+            <a:r>
+              <a:rPr lang="en-US" smtClean="0"/>
+              <a:t>Second level</a:t>
+            </a:r>
+          </a:p>
+          <a:p>
+            <a:pPr lvl="2"/>
+            <a:r>
+              <a:rPr lang="en-US" smtClean="0"/>
+              <a:t>Third level</a:t>
+            </a:r>
+          </a:p>
+          <a:p>
+            <a:pPr lvl="3"/>
+            <a:r>
+              <a:rPr lang="en-US" smtClean="0"/>
+              <a:t>Fourth level</a:t>
+            </a:r>
+          </a:p>
+          <a:p>
+            <a:pPr lvl="4"/>
+            <a:r>
+              <a:rPr lang="en-US" smtClean="0"/>
+              <a:t>Fifth level</a:t>
+            </a:r>
+            <a:endParaRPr lang="en-US"/>
+          </a:p>
+        </p:txBody>
+      </p:sp>
+      <p:sp>
+        <p:nvSpPr>
+          <p:cNvPr id="4" name="Text Placeholder 3"/>
+          <p:cNvSpPr>
+            <a:spLocks noGrp="1"/>
+          </p:cNvSpPr>
+          <p:nvPr>
+            <p:ph type="body" sz="half" idx="2"/>
+          </p:nvPr>
+        </p:nvSpPr>
+        <p:spPr>
+          <a:xfrm>
+            <a:off x="457200" y="1435100"/>
+            <a:ext cx="3008313" cy="4691063"/>
+          </a:xfrm>
+        </p:spPr>
+        <p:txBody>
+          <a:bodyPr/>
+          <a:lstStyle>
+            <a:lvl1pPr marL="0" indent="0">
+              <a:buNone/>
+              <a:defRPr sz="1400"/>
+            </a:lvl1pPr>
+            <a:lvl2pPr marL="457200" indent="0">
+              <a:buNone/>
+              <a:defRPr sz="1200"/>
+            </a:lvl2pPr>
+            <a:lvl3pPr marL="914400" indent="0">
+              <a:buNone/>
+              <a:defRPr sz="1000"/>
+            </a:lvl3pPr>
+            <a:lvl4pPr marL="1371600" indent="0">
+              <a:buNone/>
+              <a:defRPr sz="900"/>
+            </a:lvl4pPr>
+            <a:lvl5pPr marL="1828800" indent="0">
+              <a:buNone/>
+              <a:defRPr sz="900"/>
+            </a:lvl5pPr>
+            <a:lvl6pPr marL="2286000" indent="0">
+              <a:buNone/>
+              <a:defRPr sz="900"/>
+            </a:lvl6pPr>
+            <a:lvl7pPr marL="2743200" indent="0">
+              <a:buNone/>
+              <a:defRPr sz="900"/>
+            </a:lvl7pPr>
+            <a:lvl8pPr marL="3200400" indent="0">
+              <a:buNone/>
+              <a:defRPr sz="900"/>
+            </a:lvl8pPr>
+            <a:lvl9pPr marL="3657600" indent="0">
+              <a:buNone/>
+              <a:defRPr sz="900"/>
+            </a:lvl9pPr>
+          </a:lstStyle>
+          <a:p>
+            <a:pPr lvl="0"/>
+            <a:r>
+              <a:rPr lang="en-US" smtClean="0"/>
+              <a:t>Click to edit Master text styles</a:t>
+            </a:r>
+          </a:p>
+        </p:txBody>
+      </p:sp>
+      <p:sp>
+        <p:nvSpPr>
+          <p:cNvPr id="5" name="Date Placeholder 4"/>
+          <p:cNvSpPr>
+            <a:spLocks noGrp="1"/>
+          </p:cNvSpPr>
+          <p:nvPr>
+            <p:ph type="dt" sz="half" idx="10"/>
+          </p:nvPr>
+        </p:nvSpPr>
+        <p:spPr/>
+        <p:txBody>
+          <a:bodyPr/>
+          <a:lstStyle/>
+          <a:p>
+            <a:fld id="{6E5077B5-BB57-49DB-88CA-226A139E5C01}" type="datetime1">
+              <a:rPr lang="en-US" smtClean="0"/>
+              <a:t>10/5/2015</a:t>
+            </a:fld>
+            <a:endParaRPr lang="en-US"/>
+          </a:p>
+        </p:txBody>
+      </p:sp>
+      <p:sp>
+        <p:nvSpPr>
+          <p:cNvPr id="6" name="Footer Placeholder 5"/>
+          <p:cNvSpPr>
+            <a:spLocks noGrp="1"/>
+          </p:cNvSpPr>
+          <p:nvPr>
+            <p:ph type="ftr" sz="quarter" idx="11"/>
+          </p:nvPr>
+        </p:nvSpPr>
+        <p:spPr/>
+        <p:txBody>
+          <a:bodyPr/>
+          <a:lstStyle/>
+          <a:p>
+            <a:endParaRPr lang="en-US"/>
+          </a:p>
+        </p:txBody>
+      </p:sp>
+      <p:sp>
+        <p:nvSpPr>
+          <p:cNvPr id="7" name="Slide Number Placeholder 6"/>
+          <p:cNvSpPr>
+            <a:spLocks noGrp="1"/>
+          </p:cNvSpPr>
+          <p:nvPr>
+            <p:ph type="sldNum" sz="quarter" idx="12"/>
+          </p:nvPr>
+        </p:nvSpPr>
+        <p:spPr/>
+        <p:txBody>
+          <a:bodyPr/>
+          <a:lstStyle/>
+          <a:p>
+            <a:fld id="{2AF3B5EA-18B6-4040-9F78-6052AF49C681}" type="slidenum">
+              <a:rPr lang="en-US" smtClean="0"/>
+              <a:t>‹#›</a:t>
+            </a:fld>
+            <a:endParaRPr lang="en-US"/>
+          </a:p>
+        </p:txBody>
+      </p:sp>
+    </p:spTree>
+    <p:extLst>
+      <p:ext uri="{BB962C8B-B14F-4D97-AF65-F5344CB8AC3E}">
+        <p14:creationId xmlns:p14="http://schemas.microsoft.com/office/powerpoint/2010/main" val="1092863"/>
+      </p:ext>
+    </p:extLst>
+  </p:cSld>
+  <p:clrMapOvr>
+    <a:masterClrMapping/>
+  </p:clrMapOvr>
+</p:sldLayout>
+</file>
+
+<file path=ppt/slideLayouts/slideLayout12.xml><?xml version="1.0" encoding="utf-8"?>
 <p:sldLayout xmlns:a="http://schemas.openxmlformats.org/drawingml/2006/main" xmlns:r="http://schemas.openxmlformats.org/officeDocument/2006/relationships" xmlns:p="http://schemas.openxmlformats.org/presentationml/2006/main" type="picTx" preserve="1">
   <p:cSld name="Picture with Caption">
     <p:spTree>
@@ -1034,9 +1410,9 @@
           <a:bodyPr/>
           <a:lstStyle/>
           <a:p>
-            <a:fld id="{5BAAF508-2C40-4348-B0A9-F9C5EE941ED8}" type="datetime1">
-              <a:rPr lang="en-US" smtClean="0"/>
-              <a:t>10/19/2014</a:t>
+            <a:fld id="{C48D9447-CBD6-49A1-89FD-8512A8CF8999}" type="datetime1">
+              <a:rPr lang="en-US" smtClean="0"/>
+              <a:t>10/5/2015</a:t>
             </a:fld>
             <a:endParaRPr lang="en-US"/>
           </a:p>
@@ -1076,9 +1452,8 @@
           <a:bodyPr/>
           <a:lstStyle/>
           <a:p>
-            <a:fld id="{9F4492BD-6A9C-48FC-AC76-0B4FE11194A1}" type="slidenum">
-              <a:rPr lang="en-US" smtClean="0"/>
-              <a:pPr/>
+            <a:fld id="{2AF3B5EA-18B6-4040-9F78-6052AF49C681}" type="slidenum">
+              <a:rPr lang="en-US" smtClean="0"/>
               <a:t>‹#›</a:t>
             </a:fld>
             <a:endParaRPr lang="en-US"/>
@@ -1086,6 +1461,11 @@
         </p:txBody>
       </p:sp>
     </p:spTree>
+    <p:extLst>
+      <p:ext uri="{BB962C8B-B14F-4D97-AF65-F5344CB8AC3E}">
+        <p14:creationId xmlns:p14="http://schemas.microsoft.com/office/powerpoint/2010/main" val="3841925131"/>
+      </p:ext>
+    </p:extLst>
   </p:cSld>
   <p:clrMapOvr>
     <a:masterClrMapping/>
@@ -1093,7 +1473,7 @@
 </p:sldLayout>
 </file>
 
-<file path=ppt/slideLayouts/slideLayout11.xml><?xml version="1.0" encoding="utf-8"?>
+<file path=ppt/slideLayouts/slideLayout13.xml><?xml version="1.0" encoding="utf-8"?>
 <p:sldLayout xmlns:a="http://schemas.openxmlformats.org/drawingml/2006/main" xmlns:r="http://schemas.openxmlformats.org/officeDocument/2006/relationships" xmlns:p="http://schemas.openxmlformats.org/presentationml/2006/main" type="vertTx" preserve="1">
   <p:cSld name="Title and Vertical Text">
     <p:spTree>
@@ -1200,9 +1580,9 @@
           <a:bodyPr/>
           <a:lstStyle/>
           <a:p>
-            <a:fld id="{89E6A266-1D89-43BA-B7C6-67DA685766F5}" type="datetime1">
-              <a:rPr lang="en-US" smtClean="0"/>
-              <a:t>10/19/2014</a:t>
+            <a:fld id="{A3639A2A-823D-48B7-9ACE-7FAF42870BA9}" type="datetime1">
+              <a:rPr lang="en-US" smtClean="0"/>
+              <a:t>10/5/2015</a:t>
             </a:fld>
             <a:endParaRPr lang="en-US"/>
           </a:p>
@@ -1242,9 +1622,8 @@
           <a:bodyPr/>
           <a:lstStyle/>
           <a:p>
-            <a:fld id="{9F4492BD-6A9C-48FC-AC76-0B4FE11194A1}" type="slidenum">
-              <a:rPr lang="en-US" smtClean="0"/>
-              <a:pPr/>
+            <a:fld id="{2AF3B5EA-18B6-4040-9F78-6052AF49C681}" type="slidenum">
+              <a:rPr lang="en-US" smtClean="0"/>
               <a:t>‹#›</a:t>
             </a:fld>
             <a:endParaRPr lang="en-US"/>
@@ -1252,6 +1631,11 @@
         </p:txBody>
       </p:sp>
     </p:spTree>
+    <p:extLst>
+      <p:ext uri="{BB962C8B-B14F-4D97-AF65-F5344CB8AC3E}">
+        <p14:creationId xmlns:p14="http://schemas.microsoft.com/office/powerpoint/2010/main" val="2769865735"/>
+      </p:ext>
+    </p:extLst>
   </p:cSld>
   <p:clrMapOvr>
     <a:masterClrMapping/>
@@ -1259,7 +1643,7 @@
 </p:sldLayout>
 </file>
 
-<file path=ppt/slideLayouts/slideLayout12.xml><?xml version="1.0" encoding="utf-8"?>
+<file path=ppt/slideLayouts/slideLayout14.xml><?xml version="1.0" encoding="utf-8"?>
 <p:sldLayout xmlns:a="http://schemas.openxmlformats.org/drawingml/2006/main" xmlns:r="http://schemas.openxmlformats.org/officeDocument/2006/relationships" xmlns:p="http://schemas.openxmlformats.org/presentationml/2006/main" type="vertTitleAndTx" preserve="1">
   <p:cSld name="Vertical Title and Text">
     <p:spTree>
@@ -1376,9 +1760,9 @@
           <a:bodyPr/>
           <a:lstStyle/>
           <a:p>
-            <a:fld id="{E0A7B379-9CF7-46D2-891C-33D450BA63CB}" type="datetime1">
-              <a:rPr lang="en-US" smtClean="0"/>
-              <a:t>10/19/2014</a:t>
+            <a:fld id="{ED1B6996-82E9-463C-972C-7B56056E426C}" type="datetime1">
+              <a:rPr lang="en-US" smtClean="0"/>
+              <a:t>10/5/2015</a:t>
             </a:fld>
             <a:endParaRPr lang="en-US"/>
           </a:p>
@@ -1418,9 +1802,8 @@
           <a:bodyPr/>
           <a:lstStyle/>
           <a:p>
-            <a:fld id="{9F4492BD-6A9C-48FC-AC76-0B4FE11194A1}" type="slidenum">
-              <a:rPr lang="en-US" smtClean="0"/>
-              <a:pPr/>
+            <a:fld id="{2AF3B5EA-18B6-4040-9F78-6052AF49C681}" type="slidenum">
+              <a:rPr lang="en-US" smtClean="0"/>
               <a:t>‹#›</a:t>
             </a:fld>
             <a:endParaRPr lang="en-US"/>
@@ -1428,6 +1811,11 @@
         </p:txBody>
       </p:sp>
     </p:spTree>
+    <p:extLst>
+      <p:ext uri="{BB962C8B-B14F-4D97-AF65-F5344CB8AC3E}">
+        <p14:creationId xmlns:p14="http://schemas.microsoft.com/office/powerpoint/2010/main" val="818941470"/>
+      </p:ext>
+    </p:extLst>
   </p:cSld>
   <p:clrMapOvr>
     <a:masterClrMapping/>
@@ -1462,16 +1850,22 @@
             <p:ph type="title"/>
           </p:nvPr>
         </p:nvSpPr>
-        <p:spPr/>
-        <p:txBody>
-          <a:bodyPr/>
-          <a:lstStyle/>
-          <a:p>
-            <a:r>
-              <a:rPr lang="en-US" smtClean="0"/>
+        <p:spPr>
+          <a:ln w="28575">
+            <a:solidFill>
+              <a:schemeClr val="accent1"/>
+            </a:solidFill>
+          </a:ln>
+        </p:spPr>
+        <p:txBody>
+          <a:bodyPr/>
+          <a:lstStyle/>
+          <a:p>
+            <a:r>
+              <a:rPr lang="en-US" dirty="0" smtClean="0"/>
               <a:t>Click to edit Master title style</a:t>
             </a:r>
-            <a:endParaRPr lang="en-US"/>
+            <a:endParaRPr lang="en-US" dirty="0"/>
           </a:p>
         </p:txBody>
       </p:sp>
@@ -1542,9 +1936,9 @@
           <a:bodyPr/>
           <a:lstStyle/>
           <a:p>
-            <a:fld id="{0ED49401-4DB0-45F6-8196-359795B4B31E}" type="datetime1">
-              <a:rPr lang="en-US" smtClean="0"/>
-              <a:t>10/19/2014</a:t>
+            <a:fld id="{E22ED4DA-448D-4BB1-B935-CC112220207B}" type="datetime1">
+              <a:rPr lang="en-US" smtClean="0"/>
+              <a:t>10/5/2015</a:t>
             </a:fld>
             <a:endParaRPr lang="en-US"/>
           </a:p>
@@ -1584,9 +1978,8 @@
           <a:bodyPr/>
           <a:lstStyle/>
           <a:p>
-            <a:fld id="{9F4492BD-6A9C-48FC-AC76-0B4FE11194A1}" type="slidenum">
-              <a:rPr lang="en-US" smtClean="0"/>
-              <a:pPr/>
+            <a:fld id="{2AF3B5EA-18B6-4040-9F78-6052AF49C681}" type="slidenum">
+              <a:rPr lang="en-US" smtClean="0"/>
               <a:t>‹#›</a:t>
             </a:fld>
             <a:endParaRPr lang="en-US"/>
@@ -1594,6 +1987,11 @@
         </p:txBody>
       </p:sp>
     </p:spTree>
+    <p:extLst>
+      <p:ext uri="{BB962C8B-B14F-4D97-AF65-F5344CB8AC3E}">
+        <p14:creationId xmlns:p14="http://schemas.microsoft.com/office/powerpoint/2010/main" val="1538227916"/>
+      </p:ext>
+    </p:extLst>
   </p:cSld>
   <p:clrMapOvr>
     <a:masterClrMapping/>
@@ -1610,7 +2008,7 @@
 
 <file path=ppt/slideLayouts/slideLayout3.xml><?xml version="1.0" encoding="utf-8"?>
 <p:sldLayout xmlns:a="http://schemas.openxmlformats.org/drawingml/2006/main" xmlns:r="http://schemas.openxmlformats.org/officeDocument/2006/relationships" xmlns:p="http://schemas.openxmlformats.org/presentationml/2006/main" type="obj" preserve="1">
-  <p:cSld name="Code">
+  <p:cSld name="Video">
     <p:spTree>
       <p:nvGrpSpPr>
         <p:cNvPr id="1" name=""/>
@@ -1658,18 +2056,15 @@
             <p:ph idx="1"/>
           </p:nvPr>
         </p:nvSpPr>
-        <p:spPr/>
-        <p:txBody>
-          <a:bodyPr/>
-          <a:lstStyle>
-            <a:lvl1pPr marL="0" indent="0">
-              <a:buNone/>
-              <a:defRPr b="1">
-                <a:latin typeface="Consolas" pitchFamily="49" charset="0"/>
-                <a:cs typeface="Consolas" pitchFamily="49" charset="0"/>
-              </a:defRPr>
-            </a:lvl1pPr>
-          </a:lstStyle>
+        <p:spPr>
+          <a:xfrm>
+            <a:off x="1523999" y="2590798"/>
+            <a:ext cx="6096000" cy="2544763"/>
+          </a:xfrm>
+        </p:spPr>
+        <p:txBody>
+          <a:bodyPr/>
+          <a:lstStyle/>
           <a:p>
             <a:pPr lvl="0"/>
             <a:r>
@@ -1723,9 +2118,9 @@
           <a:bodyPr/>
           <a:lstStyle/>
           <a:p>
-            <a:fld id="{35E0B01C-6428-4EC8-9BD1-E06C01AD4BAE}" type="datetime1">
-              <a:rPr lang="en-US" smtClean="0"/>
-              <a:t>10/19/2014</a:t>
+            <a:fld id="{E22ED4DA-448D-4BB1-B935-CC112220207B}" type="datetime1">
+              <a:rPr lang="en-US" smtClean="0"/>
+              <a:t>10/5/2015</a:t>
             </a:fld>
             <a:endParaRPr lang="en-US"/>
           </a:p>
@@ -1765,19 +2160,102 @@
           <a:bodyPr/>
           <a:lstStyle/>
           <a:p>
-            <a:fld id="{9F4492BD-6A9C-48FC-AC76-0B4FE11194A1}" type="slidenum">
-              <a:rPr lang="en-US" smtClean="0"/>
-              <a:pPr/>
+            <a:fld id="{2AF3B5EA-18B6-4040-9F78-6052AF49C681}" type="slidenum">
+              <a:rPr lang="en-US" smtClean="0"/>
               <a:t>‹#›</a:t>
             </a:fld>
             <a:endParaRPr lang="en-US"/>
+          </a:p>
+        </p:txBody>
+      </p:sp>
+      <p:sp>
+        <p:nvSpPr>
+          <p:cNvPr id="7" name="Rectangle 6"/>
+          <p:cNvSpPr/>
+          <p:nvPr userDrawn="1"/>
+        </p:nvSpPr>
+        <p:spPr>
+          <a:xfrm>
+            <a:off x="794551" y="1719223"/>
+            <a:ext cx="7554897" cy="4287915"/>
+          </a:xfrm>
+          <a:prstGeom prst="rect">
+            <a:avLst/>
+          </a:prstGeom>
+          <a:noFill/>
+          <a:ln w="12700">
+            <a:solidFill>
+              <a:schemeClr val="tx1"/>
+            </a:solidFill>
+          </a:ln>
+        </p:spPr>
+        <p:style>
+          <a:lnRef idx="2">
+            <a:schemeClr val="accent1">
+              <a:shade val="50000"/>
+            </a:schemeClr>
+          </a:lnRef>
+          <a:fillRef idx="1">
+            <a:schemeClr val="accent1"/>
+          </a:fillRef>
+          <a:effectRef idx="0">
+            <a:schemeClr val="accent1"/>
+          </a:effectRef>
+          <a:fontRef idx="minor">
+            <a:schemeClr val="lt1"/>
+          </a:fontRef>
+        </p:style>
+        <p:txBody>
+          <a:bodyPr rtlCol="0" anchor="ctr"/>
+          <a:lstStyle/>
+          <a:p>
+            <a:pPr algn="ctr"/>
+            <a:endParaRPr lang="en-US" dirty="0" smtClean="0">
+              <a:solidFill>
+                <a:schemeClr val="tx1"/>
+              </a:solidFill>
+            </a:endParaRPr>
+          </a:p>
+        </p:txBody>
+      </p:sp>
+      <p:sp>
+        <p:nvSpPr>
+          <p:cNvPr id="8" name="TextBox 7"/>
+          <p:cNvSpPr txBox="1"/>
+          <p:nvPr userDrawn="1"/>
+        </p:nvSpPr>
+        <p:spPr>
+          <a:xfrm>
+            <a:off x="5943600" y="1793674"/>
+            <a:ext cx="2286000" cy="646331"/>
+          </a:xfrm>
+          <a:prstGeom prst="rect">
+            <a:avLst/>
+          </a:prstGeom>
+          <a:noFill/>
+        </p:spPr>
+        <p:txBody>
+          <a:bodyPr wrap="square" rtlCol="0">
+            <a:spAutoFit/>
+          </a:bodyPr>
+          <a:lstStyle/>
+          <a:p>
+            <a:r>
+              <a:rPr lang="en-US" dirty="0" smtClean="0"/>
+              <a:t>Resize video to this</a:t>
+            </a:r>
+            <a:r>
+              <a:rPr lang="en-US" baseline="0" dirty="0" smtClean="0"/>
+              <a:t> box.</a:t>
+            </a:r>
+            <a:endParaRPr lang="en-US" dirty="0"/>
           </a:p>
         </p:txBody>
       </p:sp>
     </p:spTree>
     <p:extLst>
       <p:ext uri="{BB962C8B-B14F-4D97-AF65-F5344CB8AC3E}">
-        <p14:creationId xmlns:p14="http://schemas.microsoft.com/office/powerpoint/2010/main" val="2992564840"/>
+        <p14:creationId xmlns:p14="http://schemas.microsoft.com/office/powerpoint/2010/main" val="1994672523"/>
       </p:ext>
     </p:extLst>
   </p:cSld>
@@ -1795,6 +2273,425 @@
 </file>
 
 <file path=ppt/slideLayouts/slideLayout4.xml><?xml version="1.0" encoding="utf-8"?>
+<p:sldLayout xmlns:a="http://schemas.openxmlformats.org/drawingml/2006/main" xmlns:r="http://schemas.openxmlformats.org/officeDocument/2006/relationships" xmlns:p="http://schemas.openxmlformats.org/presentationml/2006/main" type="obj" preserve="1">
+  <p:cSld name="Code">
+    <p:spTree>
+      <p:nvGrpSpPr>
+        <p:cNvPr id="1" name=""/>
+        <p:cNvGrpSpPr/>
+        <p:nvPr/>
+      </p:nvGrpSpPr>
+      <p:grpSpPr>
+        <a:xfrm>
+          <a:off x="0" y="0"/>
+          <a:ext cx="0" cy="0"/>
+          <a:chOff x="0" y="0"/>
+          <a:chExt cx="0" cy="0"/>
+        </a:xfrm>
+      </p:grpSpPr>
+      <p:sp>
+        <p:nvSpPr>
+          <p:cNvPr id="2" name="Title 1"/>
+          <p:cNvSpPr>
+            <a:spLocks noGrp="1"/>
+          </p:cNvSpPr>
+          <p:nvPr>
+            <p:ph type="title"/>
+          </p:nvPr>
+        </p:nvSpPr>
+        <p:spPr/>
+        <p:txBody>
+          <a:bodyPr/>
+          <a:lstStyle/>
+          <a:p>
+            <a:r>
+              <a:rPr lang="en-US" smtClean="0"/>
+              <a:t>Click to edit Master title style</a:t>
+            </a:r>
+            <a:endParaRPr lang="en-US"/>
+          </a:p>
+        </p:txBody>
+      </p:sp>
+      <p:sp>
+        <p:nvSpPr>
+          <p:cNvPr id="3" name="Content Placeholder 2"/>
+          <p:cNvSpPr>
+            <a:spLocks noGrp="1"/>
+          </p:cNvSpPr>
+          <p:nvPr>
+            <p:ph idx="1"/>
+          </p:nvPr>
+        </p:nvSpPr>
+        <p:spPr/>
+        <p:txBody>
+          <a:bodyPr/>
+          <a:lstStyle>
+            <a:lvl1pPr marL="0" indent="0">
+              <a:buNone/>
+              <a:defRPr b="1">
+                <a:latin typeface="Consolas" pitchFamily="49" charset="0"/>
+                <a:cs typeface="Consolas" pitchFamily="49" charset="0"/>
+              </a:defRPr>
+            </a:lvl1pPr>
+          </a:lstStyle>
+          <a:p>
+            <a:pPr lvl="0"/>
+            <a:r>
+              <a:rPr lang="en-US" dirty="0" smtClean="0"/>
+              <a:t>Click to edit Master text styles</a:t>
+            </a:r>
+          </a:p>
+          <a:p>
+            <a:pPr lvl="1"/>
+            <a:r>
+              <a:rPr lang="en-US" dirty="0" smtClean="0"/>
+              <a:t>Second level</a:t>
+            </a:r>
+          </a:p>
+          <a:p>
+            <a:pPr lvl="2"/>
+            <a:r>
+              <a:rPr lang="en-US" dirty="0" smtClean="0"/>
+              <a:t>Third level</a:t>
+            </a:r>
+          </a:p>
+          <a:p>
+            <a:pPr lvl="3"/>
+            <a:r>
+              <a:rPr lang="en-US" dirty="0" smtClean="0"/>
+              <a:t>Fourth level</a:t>
+            </a:r>
+          </a:p>
+          <a:p>
+            <a:pPr lvl="4"/>
+            <a:r>
+              <a:rPr lang="en-US" dirty="0" smtClean="0"/>
+              <a:t>Fifth level</a:t>
+            </a:r>
+            <a:endParaRPr lang="en-US" dirty="0"/>
+          </a:p>
+        </p:txBody>
+      </p:sp>
+      <p:sp>
+        <p:nvSpPr>
+          <p:cNvPr id="4" name="Date Placeholder 3"/>
+          <p:cNvSpPr>
+            <a:spLocks noGrp="1"/>
+          </p:cNvSpPr>
+          <p:nvPr>
+            <p:ph type="dt" sz="half" idx="10"/>
+          </p:nvPr>
+        </p:nvSpPr>
+        <p:spPr/>
+        <p:txBody>
+          <a:bodyPr/>
+          <a:lstStyle/>
+          <a:p>
+            <a:fld id="{FF5D65A6-AB94-4435-B0B7-3743215FA46C}" type="datetime1">
+              <a:rPr lang="en-US" smtClean="0"/>
+              <a:t>10/5/2015</a:t>
+            </a:fld>
+            <a:endParaRPr lang="en-US"/>
+          </a:p>
+        </p:txBody>
+      </p:sp>
+      <p:sp>
+        <p:nvSpPr>
+          <p:cNvPr id="5" name="Footer Placeholder 4"/>
+          <p:cNvSpPr>
+            <a:spLocks noGrp="1"/>
+          </p:cNvSpPr>
+          <p:nvPr>
+            <p:ph type="ftr" sz="quarter" idx="11"/>
+          </p:nvPr>
+        </p:nvSpPr>
+        <p:spPr/>
+        <p:txBody>
+          <a:bodyPr/>
+          <a:lstStyle/>
+          <a:p>
+            <a:endParaRPr lang="en-US"/>
+          </a:p>
+        </p:txBody>
+      </p:sp>
+      <p:sp>
+        <p:nvSpPr>
+          <p:cNvPr id="6" name="Slide Number Placeholder 5"/>
+          <p:cNvSpPr>
+            <a:spLocks noGrp="1"/>
+          </p:cNvSpPr>
+          <p:nvPr>
+            <p:ph type="sldNum" sz="quarter" idx="12"/>
+          </p:nvPr>
+        </p:nvSpPr>
+        <p:spPr/>
+        <p:txBody>
+          <a:bodyPr/>
+          <a:lstStyle/>
+          <a:p>
+            <a:fld id="{2AF3B5EA-18B6-4040-9F78-6052AF49C681}" type="slidenum">
+              <a:rPr lang="en-US" smtClean="0"/>
+              <a:t>‹#›</a:t>
+            </a:fld>
+            <a:endParaRPr lang="en-US"/>
+          </a:p>
+        </p:txBody>
+      </p:sp>
+    </p:spTree>
+    <p:extLst>
+      <p:ext uri="{BB962C8B-B14F-4D97-AF65-F5344CB8AC3E}">
+        <p14:creationId xmlns:p14="http://schemas.microsoft.com/office/powerpoint/2010/main" val="49028735"/>
+      </p:ext>
+    </p:extLst>
+  </p:cSld>
+  <p:clrMapOvr>
+    <a:masterClrMapping/>
+  </p:clrMapOvr>
+  <p:timing>
+    <p:tnLst>
+      <p:par>
+        <p:cTn id="1" dur="indefinite" restart="never" nodeType="tmRoot"/>
+      </p:par>
+    </p:tnLst>
+  </p:timing>
+</p:sldLayout>
+</file>
+
+<file path=ppt/slideLayouts/slideLayout5.xml><?xml version="1.0" encoding="utf-8"?>
+<p:sldLayout xmlns:a="http://schemas.openxmlformats.org/drawingml/2006/main" xmlns:r="http://schemas.openxmlformats.org/officeDocument/2006/relationships" xmlns:p="http://schemas.openxmlformats.org/presentationml/2006/main" type="obj" preserve="1">
+  <p:cSld name="Video Clip">
+    <p:spTree>
+      <p:nvGrpSpPr>
+        <p:cNvPr id="1" name=""/>
+        <p:cNvGrpSpPr/>
+        <p:nvPr/>
+      </p:nvGrpSpPr>
+      <p:grpSpPr>
+        <a:xfrm>
+          <a:off x="0" y="0"/>
+          <a:ext cx="0" cy="0"/>
+          <a:chOff x="0" y="0"/>
+          <a:chExt cx="0" cy="0"/>
+        </a:xfrm>
+      </p:grpSpPr>
+      <p:sp>
+        <p:nvSpPr>
+          <p:cNvPr id="2" name="Title 1"/>
+          <p:cNvSpPr>
+            <a:spLocks noGrp="1"/>
+          </p:cNvSpPr>
+          <p:nvPr>
+            <p:ph type="title"/>
+          </p:nvPr>
+        </p:nvSpPr>
+        <p:spPr/>
+        <p:txBody>
+          <a:bodyPr/>
+          <a:lstStyle/>
+          <a:p>
+            <a:r>
+              <a:rPr lang="en-US" smtClean="0"/>
+              <a:t>Click to edit Master title style</a:t>
+            </a:r>
+            <a:endParaRPr lang="en-US"/>
+          </a:p>
+        </p:txBody>
+      </p:sp>
+      <p:sp>
+        <p:nvSpPr>
+          <p:cNvPr id="3" name="Content Placeholder 2"/>
+          <p:cNvSpPr>
+            <a:spLocks noGrp="1"/>
+          </p:cNvSpPr>
+          <p:nvPr>
+            <p:ph idx="1"/>
+          </p:nvPr>
+        </p:nvSpPr>
+        <p:spPr/>
+        <p:txBody>
+          <a:bodyPr/>
+          <a:lstStyle>
+            <a:lvl1pPr marL="0" indent="0">
+              <a:buNone/>
+              <a:defRPr b="1">
+                <a:latin typeface="Consolas" pitchFamily="49" charset="0"/>
+                <a:cs typeface="Consolas" pitchFamily="49" charset="0"/>
+              </a:defRPr>
+            </a:lvl1pPr>
+          </a:lstStyle>
+          <a:p>
+            <a:pPr lvl="0"/>
+            <a:r>
+              <a:rPr lang="en-US" dirty="0" smtClean="0"/>
+              <a:t>Click to edit Master text styles</a:t>
+            </a:r>
+          </a:p>
+          <a:p>
+            <a:pPr lvl="1"/>
+            <a:r>
+              <a:rPr lang="en-US" dirty="0" smtClean="0"/>
+              <a:t>Second level</a:t>
+            </a:r>
+          </a:p>
+          <a:p>
+            <a:pPr lvl="2"/>
+            <a:r>
+              <a:rPr lang="en-US" dirty="0" smtClean="0"/>
+              <a:t>Third level</a:t>
+            </a:r>
+          </a:p>
+          <a:p>
+            <a:pPr lvl="3"/>
+            <a:r>
+              <a:rPr lang="en-US" dirty="0" smtClean="0"/>
+              <a:t>Fourth level</a:t>
+            </a:r>
+          </a:p>
+          <a:p>
+            <a:pPr lvl="4"/>
+            <a:r>
+              <a:rPr lang="en-US" dirty="0" smtClean="0"/>
+              <a:t>Fifth level</a:t>
+            </a:r>
+            <a:endParaRPr lang="en-US" dirty="0"/>
+          </a:p>
+        </p:txBody>
+      </p:sp>
+      <p:sp>
+        <p:nvSpPr>
+          <p:cNvPr id="4" name="Date Placeholder 3"/>
+          <p:cNvSpPr>
+            <a:spLocks noGrp="1"/>
+          </p:cNvSpPr>
+          <p:nvPr>
+            <p:ph type="dt" sz="half" idx="10"/>
+          </p:nvPr>
+        </p:nvSpPr>
+        <p:spPr/>
+        <p:txBody>
+          <a:bodyPr/>
+          <a:lstStyle/>
+          <a:p>
+            <a:fld id="{FF5D65A6-AB94-4435-B0B7-3743215FA46C}" type="datetime1">
+              <a:rPr lang="en-US" smtClean="0"/>
+              <a:t>10/5/2015</a:t>
+            </a:fld>
+            <a:endParaRPr lang="en-US"/>
+          </a:p>
+        </p:txBody>
+      </p:sp>
+      <p:sp>
+        <p:nvSpPr>
+          <p:cNvPr id="5" name="Footer Placeholder 4"/>
+          <p:cNvSpPr>
+            <a:spLocks noGrp="1"/>
+          </p:cNvSpPr>
+          <p:nvPr>
+            <p:ph type="ftr" sz="quarter" idx="11"/>
+          </p:nvPr>
+        </p:nvSpPr>
+        <p:spPr/>
+        <p:txBody>
+          <a:bodyPr/>
+          <a:lstStyle/>
+          <a:p>
+            <a:endParaRPr lang="en-US"/>
+          </a:p>
+        </p:txBody>
+      </p:sp>
+      <p:sp>
+        <p:nvSpPr>
+          <p:cNvPr id="7" name="Rectangle 6"/>
+          <p:cNvSpPr/>
+          <p:nvPr userDrawn="1"/>
+        </p:nvSpPr>
+        <p:spPr>
+          <a:xfrm>
+            <a:off x="609600" y="1676400"/>
+            <a:ext cx="7924800" cy="4343400"/>
+          </a:xfrm>
+          <a:prstGeom prst="rect">
+            <a:avLst/>
+          </a:prstGeom>
+          <a:noFill/>
+          <a:ln/>
+        </p:spPr>
+        <p:style>
+          <a:lnRef idx="2">
+            <a:schemeClr val="dk1"/>
+          </a:lnRef>
+          <a:fillRef idx="1">
+            <a:schemeClr val="lt1"/>
+          </a:fillRef>
+          <a:effectRef idx="0">
+            <a:schemeClr val="dk1"/>
+          </a:effectRef>
+          <a:fontRef idx="minor">
+            <a:schemeClr val="dk1"/>
+          </a:fontRef>
+        </p:style>
+        <p:txBody>
+          <a:bodyPr rot="0" spcFirstLastPara="0" vertOverflow="overflow" horzOverflow="overflow" vert="horz" wrap="square" lIns="91440" tIns="45720" rIns="91440" bIns="45720" numCol="1" spcCol="0" rtlCol="0" fromWordArt="0" anchor="ctr" anchorCtr="0" forceAA="0" compatLnSpc="1">
+            <a:prstTxWarp prst="textNoShape">
+              <a:avLst/>
+            </a:prstTxWarp>
+            <a:noAutofit/>
+          </a:bodyPr>
+          <a:lstStyle/>
+          <a:p>
+            <a:pPr algn="ctr"/>
+            <a:endParaRPr lang="en-US" dirty="0">
+              <a:solidFill>
+                <a:schemeClr val="tx1"/>
+              </a:solidFill>
+            </a:endParaRPr>
+          </a:p>
+        </p:txBody>
+      </p:sp>
+      <p:sp>
+        <p:nvSpPr>
+          <p:cNvPr id="6" name="Slide Number Placeholder 5"/>
+          <p:cNvSpPr>
+            <a:spLocks noGrp="1"/>
+          </p:cNvSpPr>
+          <p:nvPr>
+            <p:ph type="sldNum" sz="quarter" idx="12"/>
+          </p:nvPr>
+        </p:nvSpPr>
+        <p:spPr/>
+        <p:txBody>
+          <a:bodyPr/>
+          <a:lstStyle/>
+          <a:p>
+            <a:fld id="{2AF3B5EA-18B6-4040-9F78-6052AF49C681}" type="slidenum">
+              <a:rPr lang="en-US" smtClean="0"/>
+              <a:t>‹#›</a:t>
+            </a:fld>
+            <a:endParaRPr lang="en-US"/>
+          </a:p>
+        </p:txBody>
+      </p:sp>
+    </p:spTree>
+    <p:extLst>
+      <p:ext uri="{BB962C8B-B14F-4D97-AF65-F5344CB8AC3E}">
+        <p14:creationId xmlns:p14="http://schemas.microsoft.com/office/powerpoint/2010/main" val="3362985592"/>
+      </p:ext>
+    </p:extLst>
+  </p:cSld>
+  <p:clrMapOvr>
+    <a:masterClrMapping/>
+  </p:clrMapOvr>
+  <p:timing>
+    <p:tnLst>
+      <p:par>
+        <p:cTn id="1" dur="indefinite" restart="never" nodeType="tmRoot"/>
+      </p:par>
+    </p:tnLst>
+  </p:timing>
+</p:sldLayout>
+</file>
+
+<file path=ppt/slideLayouts/slideLayout6.xml><?xml version="1.0" encoding="utf-8"?>
 <p:sldLayout xmlns:a="http://schemas.openxmlformats.org/drawingml/2006/main" xmlns:r="http://schemas.openxmlformats.org/officeDocument/2006/relationships" xmlns:p="http://schemas.openxmlformats.org/presentationml/2006/main" type="secHead" preserve="1">
   <p:cSld name="Section Header">
     <p:spTree>
@@ -1977,9 +2874,9 @@
           <a:bodyPr/>
           <a:lstStyle/>
           <a:p>
-            <a:fld id="{1C863ADA-22C8-4338-A50A-C398ABE322D7}" type="datetime1">
-              <a:rPr lang="en-US" smtClean="0"/>
-              <a:t>10/19/2014</a:t>
+            <a:fld id="{7C193DC4-6EF0-48C9-B29C-616106A645E1}" type="datetime1">
+              <a:rPr lang="en-US" smtClean="0"/>
+              <a:t>10/5/2015</a:t>
             </a:fld>
             <a:endParaRPr lang="en-US"/>
           </a:p>
@@ -2019,9 +2916,8 @@
           <a:bodyPr/>
           <a:lstStyle/>
           <a:p>
-            <a:fld id="{9F4492BD-6A9C-48FC-AC76-0B4FE11194A1}" type="slidenum">
-              <a:rPr lang="en-US" smtClean="0"/>
-              <a:pPr/>
+            <a:fld id="{2AF3B5EA-18B6-4040-9F78-6052AF49C681}" type="slidenum">
+              <a:rPr lang="en-US" smtClean="0"/>
               <a:t>‹#›</a:t>
             </a:fld>
             <a:endParaRPr lang="en-US"/>
@@ -2029,6 +2925,11 @@
         </p:txBody>
       </p:sp>
     </p:spTree>
+    <p:extLst>
+      <p:ext uri="{BB962C8B-B14F-4D97-AF65-F5344CB8AC3E}">
+        <p14:creationId xmlns:p14="http://schemas.microsoft.com/office/powerpoint/2010/main" val="668499568"/>
+      </p:ext>
+    </p:extLst>
   </p:cSld>
   <p:clrMapOvr>
     <a:masterClrMapping/>
@@ -2036,7 +2937,7 @@
 </p:sldLayout>
 </file>
 
-<file path=ppt/slideLayouts/slideLayout5.xml><?xml version="1.0" encoding="utf-8"?>
+<file path=ppt/slideLayouts/slideLayout7.xml><?xml version="1.0" encoding="utf-8"?>
 <p:sldLayout xmlns:a="http://schemas.openxmlformats.org/drawingml/2006/main" xmlns:r="http://schemas.openxmlformats.org/officeDocument/2006/relationships" xmlns:p="http://schemas.openxmlformats.org/presentationml/2006/main" type="twoObj" preserve="1">
   <p:cSld name="Two Content">
     <p:spTree>
@@ -2261,9 +3162,9 @@
           <a:bodyPr/>
           <a:lstStyle/>
           <a:p>
-            <a:fld id="{E7C678DB-0134-46FE-8D85-27C43FD2E7E1}" type="datetime1">
-              <a:rPr lang="en-US" smtClean="0"/>
-              <a:t>10/19/2014</a:t>
+            <a:fld id="{5D1846AD-9252-4647-9435-4C2AC365653A}" type="datetime1">
+              <a:rPr lang="en-US" smtClean="0"/>
+              <a:t>10/5/2015</a:t>
             </a:fld>
             <a:endParaRPr lang="en-US"/>
           </a:p>
@@ -2303,9 +3204,8 @@
           <a:bodyPr/>
           <a:lstStyle/>
           <a:p>
-            <a:fld id="{9F4492BD-6A9C-48FC-AC76-0B4FE11194A1}" type="slidenum">
-              <a:rPr lang="en-US" smtClean="0"/>
-              <a:pPr/>
+            <a:fld id="{2AF3B5EA-18B6-4040-9F78-6052AF49C681}" type="slidenum">
+              <a:rPr lang="en-US" smtClean="0"/>
               <a:t>‹#›</a:t>
             </a:fld>
             <a:endParaRPr lang="en-US"/>
@@ -2313,6 +3213,11 @@
         </p:txBody>
       </p:sp>
     </p:spTree>
+    <p:extLst>
+      <p:ext uri="{BB962C8B-B14F-4D97-AF65-F5344CB8AC3E}">
+        <p14:creationId xmlns:p14="http://schemas.microsoft.com/office/powerpoint/2010/main" val="2055611612"/>
+      </p:ext>
+    </p:extLst>
   </p:cSld>
   <p:clrMapOvr>
     <a:masterClrMapping/>
@@ -2320,7 +3225,7 @@
 </p:sldLayout>
 </file>
 
-<file path=ppt/slideLayouts/slideLayout6.xml><?xml version="1.0" encoding="utf-8"?>
+<file path=ppt/slideLayouts/slideLayout8.xml><?xml version="1.0" encoding="utf-8"?>
 <p:sldLayout xmlns:a="http://schemas.openxmlformats.org/drawingml/2006/main" xmlns:r="http://schemas.openxmlformats.org/officeDocument/2006/relationships" xmlns:p="http://schemas.openxmlformats.org/presentationml/2006/main" type="twoTxTwoObj" preserve="1">
   <p:cSld name="Comparison">
     <p:spTree>
@@ -2679,9 +3584,9 @@
           <a:bodyPr/>
           <a:lstStyle/>
           <a:p>
-            <a:fld id="{B456F38B-0631-458D-8428-53E00492DF61}" type="datetime1">
-              <a:rPr lang="en-US" smtClean="0"/>
-              <a:t>10/19/2014</a:t>
+            <a:fld id="{CE56DC10-3561-4063-A6AF-C1CC7A41040A}" type="datetime1">
+              <a:rPr lang="en-US" smtClean="0"/>
+              <a:t>10/5/2015</a:t>
             </a:fld>
             <a:endParaRPr lang="en-US"/>
           </a:p>
@@ -2721,9 +3626,8 @@
           <a:bodyPr/>
           <a:lstStyle/>
           <a:p>
-            <a:fld id="{9F4492BD-6A9C-48FC-AC76-0B4FE11194A1}" type="slidenum">
-              <a:rPr lang="en-US" smtClean="0"/>
-              <a:pPr/>
+            <a:fld id="{2AF3B5EA-18B6-4040-9F78-6052AF49C681}" type="slidenum">
+              <a:rPr lang="en-US" smtClean="0"/>
               <a:t>‹#›</a:t>
             </a:fld>
             <a:endParaRPr lang="en-US"/>
@@ -2731,6 +3635,11 @@
         </p:txBody>
       </p:sp>
     </p:spTree>
+    <p:extLst>
+      <p:ext uri="{BB962C8B-B14F-4D97-AF65-F5344CB8AC3E}">
+        <p14:creationId xmlns:p14="http://schemas.microsoft.com/office/powerpoint/2010/main" val="2800391875"/>
+      </p:ext>
+    </p:extLst>
   </p:cSld>
   <p:clrMapOvr>
     <a:masterClrMapping/>
@@ -2738,7 +3647,7 @@
 </p:sldLayout>
 </file>
 
-<file path=ppt/slideLayouts/slideLayout7.xml><?xml version="1.0" encoding="utf-8"?>
+<file path=ppt/slideLayouts/slideLayout9.xml><?xml version="1.0" encoding="utf-8"?>
 <p:sldLayout xmlns:a="http://schemas.openxmlformats.org/drawingml/2006/main" xmlns:r="http://schemas.openxmlformats.org/officeDocument/2006/relationships" xmlns:p="http://schemas.openxmlformats.org/presentationml/2006/main" type="titleOnly" preserve="1">
   <p:cSld name="Title Only">
     <p:spTree>
@@ -2793,9 +3702,9 @@
           <a:bodyPr/>
           <a:lstStyle/>
           <a:p>
-            <a:fld id="{0ADA4E01-67A2-411A-959E-5E1969CABB25}" type="datetime1">
-              <a:rPr lang="en-US" smtClean="0"/>
-              <a:t>10/19/2014</a:t>
+            <a:fld id="{2F7B77F5-1464-4F6B-92A8-64FC8A508293}" type="datetime1">
+              <a:rPr lang="en-US" smtClean="0"/>
+              <a:t>10/5/2015</a:t>
             </a:fld>
             <a:endParaRPr lang="en-US"/>
           </a:p>
@@ -2835,9 +3744,8 @@
           <a:bodyPr/>
           <a:lstStyle/>
           <a:p>
-            <a:fld id="{9F4492BD-6A9C-48FC-AC76-0B4FE11194A1}" type="slidenum">
-              <a:rPr lang="en-US" smtClean="0"/>
-              <a:pPr/>
+            <a:fld id="{2AF3B5EA-18B6-4040-9F78-6052AF49C681}" type="slidenum">
+              <a:rPr lang="en-US" smtClean="0"/>
               <a:t>‹#›</a:t>
             </a:fld>
             <a:endParaRPr lang="en-US"/>
@@ -2845,6 +3753,11 @@
         </p:txBody>
       </p:sp>
     </p:spTree>
+    <p:extLst>
+      <p:ext uri="{BB962C8B-B14F-4D97-AF65-F5344CB8AC3E}">
+        <p14:creationId xmlns:p14="http://schemas.microsoft.com/office/powerpoint/2010/main" val="3533345711"/>
+      </p:ext>
+    </p:extLst>
   </p:cSld>
   <p:clrMapOvr>
     <a:masterClrMapping/>
@@ -2859,372 +3772,8 @@
 </p:sldLayout>
 </file>
 
-<file path=ppt/slideLayouts/slideLayout8.xml><?xml version="1.0" encoding="utf-8"?>
-<p:sldLayout xmlns:a="http://schemas.openxmlformats.org/drawingml/2006/main" xmlns:r="http://schemas.openxmlformats.org/officeDocument/2006/relationships" xmlns:p="http://schemas.openxmlformats.org/presentationml/2006/main" type="blank" preserve="1">
-  <p:cSld name="Blank">
-    <p:spTree>
-      <p:nvGrpSpPr>
-        <p:cNvPr id="1" name=""/>
-        <p:cNvGrpSpPr/>
-        <p:nvPr/>
-      </p:nvGrpSpPr>
-      <p:grpSpPr>
-        <a:xfrm>
-          <a:off x="0" y="0"/>
-          <a:ext cx="0" cy="0"/>
-          <a:chOff x="0" y="0"/>
-          <a:chExt cx="0" cy="0"/>
-        </a:xfrm>
-      </p:grpSpPr>
-      <p:sp>
-        <p:nvSpPr>
-          <p:cNvPr id="2" name="Date Placeholder 1"/>
-          <p:cNvSpPr>
-            <a:spLocks noGrp="1"/>
-          </p:cNvSpPr>
-          <p:nvPr>
-            <p:ph type="dt" sz="half" idx="10"/>
-          </p:nvPr>
-        </p:nvSpPr>
-        <p:spPr/>
-        <p:txBody>
-          <a:bodyPr/>
-          <a:lstStyle/>
-          <a:p>
-            <a:fld id="{37BFDAFA-AF52-4878-8A43-92CBC8FB79EB}" type="datetime1">
-              <a:rPr lang="en-US" smtClean="0"/>
-              <a:t>10/19/2014</a:t>
-            </a:fld>
-            <a:endParaRPr lang="en-US"/>
-          </a:p>
-        </p:txBody>
-      </p:sp>
-      <p:sp>
-        <p:nvSpPr>
-          <p:cNvPr id="3" name="Footer Placeholder 2"/>
-          <p:cNvSpPr>
-            <a:spLocks noGrp="1"/>
-          </p:cNvSpPr>
-          <p:nvPr>
-            <p:ph type="ftr" sz="quarter" idx="11"/>
-          </p:nvPr>
-        </p:nvSpPr>
-        <p:spPr/>
-        <p:txBody>
-          <a:bodyPr/>
-          <a:lstStyle/>
-          <a:p>
-            <a:endParaRPr lang="en-US"/>
-          </a:p>
-        </p:txBody>
-      </p:sp>
-      <p:sp>
-        <p:nvSpPr>
-          <p:cNvPr id="4" name="Slide Number Placeholder 3"/>
-          <p:cNvSpPr>
-            <a:spLocks noGrp="1"/>
-          </p:cNvSpPr>
-          <p:nvPr>
-            <p:ph type="sldNum" sz="quarter" idx="12"/>
-          </p:nvPr>
-        </p:nvSpPr>
-        <p:spPr/>
-        <p:txBody>
-          <a:bodyPr/>
-          <a:lstStyle/>
-          <a:p>
-            <a:fld id="{9F4492BD-6A9C-48FC-AC76-0B4FE11194A1}" type="slidenum">
-              <a:rPr lang="en-US" smtClean="0"/>
-              <a:pPr/>
-              <a:t>‹#›</a:t>
-            </a:fld>
-            <a:endParaRPr lang="en-US"/>
-          </a:p>
-        </p:txBody>
-      </p:sp>
-    </p:spTree>
-  </p:cSld>
-  <p:clrMapOvr>
-    <a:masterClrMapping/>
-  </p:clrMapOvr>
-</p:sldLayout>
-</file>
-
-<file path=ppt/slideLayouts/slideLayout9.xml><?xml version="1.0" encoding="utf-8"?>
-<p:sldLayout xmlns:a="http://schemas.openxmlformats.org/drawingml/2006/main" xmlns:r="http://schemas.openxmlformats.org/officeDocument/2006/relationships" xmlns:p="http://schemas.openxmlformats.org/presentationml/2006/main" type="objTx" preserve="1">
-  <p:cSld name="Content with Caption">
-    <p:spTree>
-      <p:nvGrpSpPr>
-        <p:cNvPr id="1" name=""/>
-        <p:cNvGrpSpPr/>
-        <p:nvPr/>
-      </p:nvGrpSpPr>
-      <p:grpSpPr>
-        <a:xfrm>
-          <a:off x="0" y="0"/>
-          <a:ext cx="0" cy="0"/>
-          <a:chOff x="0" y="0"/>
-          <a:chExt cx="0" cy="0"/>
-        </a:xfrm>
-      </p:grpSpPr>
-      <p:sp>
-        <p:nvSpPr>
-          <p:cNvPr id="2" name="Title 1"/>
-          <p:cNvSpPr>
-            <a:spLocks noGrp="1"/>
-          </p:cNvSpPr>
-          <p:nvPr>
-            <p:ph type="title"/>
-          </p:nvPr>
-        </p:nvSpPr>
-        <p:spPr>
-          <a:xfrm>
-            <a:off x="457200" y="273050"/>
-            <a:ext cx="3008313" cy="1162050"/>
-          </a:xfrm>
-        </p:spPr>
-        <p:txBody>
-          <a:bodyPr anchor="b"/>
-          <a:lstStyle>
-            <a:lvl1pPr algn="l">
-              <a:defRPr sz="2000" b="1"/>
-            </a:lvl1pPr>
-          </a:lstStyle>
-          <a:p>
-            <a:r>
-              <a:rPr lang="en-US" smtClean="0"/>
-              <a:t>Click to edit Master title style</a:t>
-            </a:r>
-            <a:endParaRPr lang="en-US"/>
-          </a:p>
-        </p:txBody>
-      </p:sp>
-      <p:sp>
-        <p:nvSpPr>
-          <p:cNvPr id="3" name="Content Placeholder 2"/>
-          <p:cNvSpPr>
-            <a:spLocks noGrp="1"/>
-          </p:cNvSpPr>
-          <p:nvPr>
-            <p:ph idx="1"/>
-          </p:nvPr>
-        </p:nvSpPr>
-        <p:spPr>
-          <a:xfrm>
-            <a:off x="3575050" y="273050"/>
-            <a:ext cx="5111750" cy="5853113"/>
-          </a:xfrm>
-        </p:spPr>
-        <p:txBody>
-          <a:bodyPr/>
-          <a:lstStyle>
-            <a:lvl1pPr>
-              <a:defRPr sz="3200"/>
-            </a:lvl1pPr>
-            <a:lvl2pPr>
-              <a:defRPr sz="2800"/>
-            </a:lvl2pPr>
-            <a:lvl3pPr>
-              <a:defRPr sz="2400"/>
-            </a:lvl3pPr>
-            <a:lvl4pPr>
-              <a:defRPr sz="2000"/>
-            </a:lvl4pPr>
-            <a:lvl5pPr>
-              <a:defRPr sz="2000"/>
-            </a:lvl5pPr>
-            <a:lvl6pPr>
-              <a:defRPr sz="2000"/>
-            </a:lvl6pPr>
-            <a:lvl7pPr>
-              <a:defRPr sz="2000"/>
-            </a:lvl7pPr>
-            <a:lvl8pPr>
-              <a:defRPr sz="2000"/>
-            </a:lvl8pPr>
-            <a:lvl9pPr>
-              <a:defRPr sz="2000"/>
-            </a:lvl9pPr>
-          </a:lstStyle>
-          <a:p>
-            <a:pPr lvl="0"/>
-            <a:r>
-              <a:rPr lang="en-US" smtClean="0"/>
-              <a:t>Click to edit Master text styles</a:t>
-            </a:r>
-          </a:p>
-          <a:p>
-            <a:pPr lvl="1"/>
-            <a:r>
-              <a:rPr lang="en-US" smtClean="0"/>
-              <a:t>Second level</a:t>
-            </a:r>
-          </a:p>
-          <a:p>
-            <a:pPr lvl="2"/>
-            <a:r>
-              <a:rPr lang="en-US" smtClean="0"/>
-              <a:t>Third level</a:t>
-            </a:r>
-          </a:p>
-          <a:p>
-            <a:pPr lvl="3"/>
-            <a:r>
-              <a:rPr lang="en-US" smtClean="0"/>
-              <a:t>Fourth level</a:t>
-            </a:r>
-          </a:p>
-          <a:p>
-            <a:pPr lvl="4"/>
-            <a:r>
-              <a:rPr lang="en-US" smtClean="0"/>
-              <a:t>Fifth level</a:t>
-            </a:r>
-            <a:endParaRPr lang="en-US"/>
-          </a:p>
-        </p:txBody>
-      </p:sp>
-      <p:sp>
-        <p:nvSpPr>
-          <p:cNvPr id="4" name="Text Placeholder 3"/>
-          <p:cNvSpPr>
-            <a:spLocks noGrp="1"/>
-          </p:cNvSpPr>
-          <p:nvPr>
-            <p:ph type="body" sz="half" idx="2"/>
-          </p:nvPr>
-        </p:nvSpPr>
-        <p:spPr>
-          <a:xfrm>
-            <a:off x="457200" y="1435100"/>
-            <a:ext cx="3008313" cy="4691063"/>
-          </a:xfrm>
-        </p:spPr>
-        <p:txBody>
-          <a:bodyPr/>
-          <a:lstStyle>
-            <a:lvl1pPr marL="0" indent="0">
-              <a:buNone/>
-              <a:defRPr sz="1400"/>
-            </a:lvl1pPr>
-            <a:lvl2pPr marL="457200" indent="0">
-              <a:buNone/>
-              <a:defRPr sz="1200"/>
-            </a:lvl2pPr>
-            <a:lvl3pPr marL="914400" indent="0">
-              <a:buNone/>
-              <a:defRPr sz="1000"/>
-            </a:lvl3pPr>
-            <a:lvl4pPr marL="1371600" indent="0">
-              <a:buNone/>
-              <a:defRPr sz="900"/>
-            </a:lvl4pPr>
-            <a:lvl5pPr marL="1828800" indent="0">
-              <a:buNone/>
-              <a:defRPr sz="900"/>
-            </a:lvl5pPr>
-            <a:lvl6pPr marL="2286000" indent="0">
-              <a:buNone/>
-              <a:defRPr sz="900"/>
-            </a:lvl6pPr>
-            <a:lvl7pPr marL="2743200" indent="0">
-              <a:buNone/>
-              <a:defRPr sz="900"/>
-            </a:lvl7pPr>
-            <a:lvl8pPr marL="3200400" indent="0">
-              <a:buNone/>
-              <a:defRPr sz="900"/>
-            </a:lvl8pPr>
-            <a:lvl9pPr marL="3657600" indent="0">
-              <a:buNone/>
-              <a:defRPr sz="900"/>
-            </a:lvl9pPr>
-          </a:lstStyle>
-          <a:p>
-            <a:pPr lvl="0"/>
-            <a:r>
-              <a:rPr lang="en-US" smtClean="0"/>
-              <a:t>Click to edit Master text styles</a:t>
-            </a:r>
-          </a:p>
-        </p:txBody>
-      </p:sp>
-      <p:sp>
-        <p:nvSpPr>
-          <p:cNvPr id="5" name="Date Placeholder 4"/>
-          <p:cNvSpPr>
-            <a:spLocks noGrp="1"/>
-          </p:cNvSpPr>
-          <p:nvPr>
-            <p:ph type="dt" sz="half" idx="10"/>
-          </p:nvPr>
-        </p:nvSpPr>
-        <p:spPr/>
-        <p:txBody>
-          <a:bodyPr/>
-          <a:lstStyle/>
-          <a:p>
-            <a:fld id="{7B10401E-A63B-4FED-83FD-21457685622C}" type="datetime1">
-              <a:rPr lang="en-US" smtClean="0"/>
-              <a:t>10/19/2014</a:t>
-            </a:fld>
-            <a:endParaRPr lang="en-US"/>
-          </a:p>
-        </p:txBody>
-      </p:sp>
-      <p:sp>
-        <p:nvSpPr>
-          <p:cNvPr id="6" name="Footer Placeholder 5"/>
-          <p:cNvSpPr>
-            <a:spLocks noGrp="1"/>
-          </p:cNvSpPr>
-          <p:nvPr>
-            <p:ph type="ftr" sz="quarter" idx="11"/>
-          </p:nvPr>
-        </p:nvSpPr>
-        <p:spPr/>
-        <p:txBody>
-          <a:bodyPr/>
-          <a:lstStyle/>
-          <a:p>
-            <a:endParaRPr lang="en-US"/>
-          </a:p>
-        </p:txBody>
-      </p:sp>
-      <p:sp>
-        <p:nvSpPr>
-          <p:cNvPr id="7" name="Slide Number Placeholder 6"/>
-          <p:cNvSpPr>
-            <a:spLocks noGrp="1"/>
-          </p:cNvSpPr>
-          <p:nvPr>
-            <p:ph type="sldNum" sz="quarter" idx="12"/>
-          </p:nvPr>
-        </p:nvSpPr>
-        <p:spPr/>
-        <p:txBody>
-          <a:bodyPr/>
-          <a:lstStyle/>
-          <a:p>
-            <a:fld id="{9F4492BD-6A9C-48FC-AC76-0B4FE11194A1}" type="slidenum">
-              <a:rPr lang="en-US" smtClean="0"/>
-              <a:pPr/>
-              <a:t>‹#›</a:t>
-            </a:fld>
-            <a:endParaRPr lang="en-US"/>
-          </a:p>
-        </p:txBody>
-      </p:sp>
-    </p:spTree>
-  </p:cSld>
-  <p:clrMapOvr>
-    <a:masterClrMapping/>
-  </p:clrMapOvr>
-</p:sldLayout>
-</file>
-
 <file path=ppt/slideMasters/slideMaster1.xml><?xml version="1.0" encoding="utf-8"?>
-<p:sldMaster xmlns:a="http://schemas.openxmlformats.org/drawingml/2006/main" xmlns:r="http://schemas.openxmlformats.org/officeDocument/2006/relationships" xmlns:p="http://schemas.openxmlformats.org/presentationml/2006/main">
+<p:sldMaster xmlns:a="http://schemas.openxmlformats.org/drawingml/2006/main" xmlns:r="http://schemas.openxmlformats.org/officeDocument/2006/relationships" xmlns:p="http://schemas.openxmlformats.org/presentationml/2006/main" preserve="1">
   <p:cSld>
     <p:bg>
       <p:bgRef idx="1001">
@@ -3264,6 +3813,18 @@
             <a:avLst/>
           </a:prstGeom>
         </p:spPr>
+        <p:style>
+          <a:lnRef idx="2">
+            <a:schemeClr val="accent1"/>
+          </a:lnRef>
+          <a:fillRef idx="1">
+            <a:schemeClr val="lt1"/>
+          </a:fillRef>
+          <a:effectRef idx="0">
+            <a:schemeClr val="accent1"/>
+          </a:effectRef>
+          <a:fontRef idx="none"/>
+        </p:style>
         <p:txBody>
           <a:bodyPr vert="horz" lIns="91440" tIns="45720" rIns="91440" bIns="45720" rtlCol="0" anchor="ctr">
             <a:normAutofit/>
@@ -3373,9 +3934,9 @@
             </a:lvl1pPr>
           </a:lstStyle>
           <a:p>
-            <a:fld id="{FED199A1-A90E-4DAA-97D0-B8EA8DEB30B6}" type="datetime1">
-              <a:rPr lang="en-US" smtClean="0"/>
-              <a:t>10/19/2014</a:t>
+            <a:fld id="{02B3F677-983B-48DB-ADFD-63FE6CBC7FB2}" type="datetime1">
+              <a:rPr lang="en-US" smtClean="0"/>
+              <a:t>10/5/2015</a:t>
             </a:fld>
             <a:endParaRPr lang="en-US"/>
           </a:p>
@@ -3451,9 +4012,8 @@
             </a:lvl1pPr>
           </a:lstStyle>
           <a:p>
-            <a:fld id="{9F4492BD-6A9C-48FC-AC76-0B4FE11194A1}" type="slidenum">
-              <a:rPr lang="en-US" smtClean="0"/>
-              <a:pPr/>
+            <a:fld id="{2AF3B5EA-18B6-4040-9F78-6052AF49C681}" type="slidenum">
+              <a:rPr lang="en-US" smtClean="0"/>
               <a:t>‹#›</a:t>
             </a:fld>
             <a:endParaRPr lang="en-US"/>
@@ -3461,21 +4021,28 @@
         </p:txBody>
       </p:sp>
     </p:spTree>
+    <p:extLst>
+      <p:ext uri="{BB962C8B-B14F-4D97-AF65-F5344CB8AC3E}">
+        <p14:creationId xmlns:p14="http://schemas.microsoft.com/office/powerpoint/2010/main" val="1217482791"/>
+      </p:ext>
+    </p:extLst>
   </p:cSld>
   <p:clrMap bg1="lt1" tx1="dk1" bg2="lt2" tx2="dk2" accent1="accent1" accent2="accent2" accent3="accent3" accent4="accent4" accent5="accent5" accent6="accent6" hlink="hlink" folHlink="folHlink"/>
   <p:sldLayoutIdLst>
-    <p:sldLayoutId id="2147483649" r:id="rId1"/>
-    <p:sldLayoutId id="2147483650" r:id="rId2"/>
-    <p:sldLayoutId id="2147483660" r:id="rId3"/>
-    <p:sldLayoutId id="2147483651" r:id="rId4"/>
-    <p:sldLayoutId id="2147483652" r:id="rId5"/>
-    <p:sldLayoutId id="2147483653" r:id="rId6"/>
-    <p:sldLayoutId id="2147483654" r:id="rId7"/>
-    <p:sldLayoutId id="2147483655" r:id="rId8"/>
-    <p:sldLayoutId id="2147483656" r:id="rId9"/>
-    <p:sldLayoutId id="2147483657" r:id="rId10"/>
-    <p:sldLayoutId id="2147483658" r:id="rId11"/>
-    <p:sldLayoutId id="2147483659" r:id="rId12"/>
+    <p:sldLayoutId id="2147483661" r:id="rId1"/>
+    <p:sldLayoutId id="2147483662" r:id="rId2"/>
+    <p:sldLayoutId id="2147483663" r:id="rId3"/>
+    <p:sldLayoutId id="2147483664" r:id="rId4"/>
+    <p:sldLayoutId id="2147483665" r:id="rId5"/>
+    <p:sldLayoutId id="2147483666" r:id="rId6"/>
+    <p:sldLayoutId id="2147483667" r:id="rId7"/>
+    <p:sldLayoutId id="2147483668" r:id="rId8"/>
+    <p:sldLayoutId id="2147483669" r:id="rId9"/>
+    <p:sldLayoutId id="2147483670" r:id="rId10"/>
+    <p:sldLayoutId id="2147483671" r:id="rId11"/>
+    <p:sldLayoutId id="2147483672" r:id="rId12"/>
+    <p:sldLayoutId id="2147483673" r:id="rId13"/>
+    <p:sldLayoutId id="2147483674" r:id="rId14"/>
   </p:sldLayoutIdLst>
   <p:timing>
     <p:tnLst>
@@ -3814,6 +4381,30 @@
       </p:sp>
       <p:sp>
         <p:nvSpPr>
+          <p:cNvPr id="11" name="Slide Number Placeholder 10"/>
+          <p:cNvSpPr>
+            <a:spLocks noGrp="1"/>
+          </p:cNvSpPr>
+          <p:nvPr>
+            <p:ph type="sldNum" sz="quarter" idx="12"/>
+          </p:nvPr>
+        </p:nvSpPr>
+        <p:spPr/>
+        <p:txBody>
+          <a:bodyPr/>
+          <a:lstStyle/>
+          <a:p>
+            <a:fld id="{9F4492BD-6A9C-48FC-AC76-0B4FE11194A1}" type="slidenum">
+              <a:rPr lang="en-US" smtClean="0"/>
+              <a:pPr/>
+              <a:t>1</a:t>
+            </a:fld>
+            <a:endParaRPr lang="en-US"/>
+          </a:p>
+        </p:txBody>
+      </p:sp>
+      <p:sp>
+        <p:nvSpPr>
           <p:cNvPr id="4" name="TextBox 3"/>
           <p:cNvSpPr txBox="1"/>
           <p:nvPr>
@@ -3999,31 +4590,12 @@
           </p:txBody>
         </p:sp>
       </p:grpSp>
-      <p:sp>
-        <p:nvSpPr>
-          <p:cNvPr id="11" name="Slide Number Placeholder 10"/>
-          <p:cNvSpPr>
-            <a:spLocks noGrp="1"/>
-          </p:cNvSpPr>
-          <p:nvPr>
-            <p:ph type="sldNum" sz="quarter" idx="12"/>
-          </p:nvPr>
-        </p:nvSpPr>
-        <p:spPr/>
-        <p:txBody>
-          <a:bodyPr/>
-          <a:lstStyle/>
-          <a:p>
-            <a:fld id="{9F4492BD-6A9C-48FC-AC76-0B4FE11194A1}" type="slidenum">
-              <a:rPr lang="en-US" smtClean="0"/>
-              <a:pPr/>
-              <a:t>1</a:t>
-            </a:fld>
-            <a:endParaRPr lang="en-US"/>
-          </a:p>
-        </p:txBody>
-      </p:sp>
     </p:spTree>
+    <p:extLst>
+      <p:ext uri="{BB962C8B-B14F-4D97-AF65-F5344CB8AC3E}">
+        <p14:creationId xmlns:p14="http://schemas.microsoft.com/office/powerpoint/2010/main" val="1196911330"/>
+      </p:ext>
+    </p:extLst>
   </p:cSld>
   <p:clrMapOvr>
     <a:masterClrMapping/>
@@ -4101,25 +4673,46 @@
           <a:p>
             <a:r>
               <a:rPr lang="en-US" dirty="0" smtClean="0"/>
-              <a:t>Choose a midpoint p in [</a:t>
-            </a:r>
-            <a:r>
-              <a:rPr lang="en-US" dirty="0" err="1" smtClean="0"/>
+              <a:t>Choose a midpoint </a:t>
+            </a:r>
+            <a:r>
+              <a:rPr lang="en-US" b="1" dirty="0" smtClean="0"/>
+              <a:t>p</a:t>
+            </a:r>
+            <a:r>
+              <a:rPr lang="en-US" dirty="0" smtClean="0"/>
+              <a:t> in [</a:t>
+            </a:r>
+            <a:r>
+              <a:rPr lang="en-US" b="1" dirty="0" err="1" smtClean="0"/>
               <a:t>lo,hi</a:t>
             </a:r>
             <a:r>
               <a:rPr lang="en-US" dirty="0" smtClean="0"/>
-              <a:t>].</a:t>
-            </a:r>
+              <a:t>]</a:t>
+            </a:r>
+            <a:r>
+              <a:rPr lang="en-US" dirty="0"/>
+              <a:t> </a:t>
+            </a:r>
+            <a:r>
+              <a:rPr lang="en-US" dirty="0" smtClean="0"/>
+              <a:t>.</a:t>
+            </a:r>
+            <a:endParaRPr lang="en-US" b="1" dirty="0" smtClean="0"/>
           </a:p>
           <a:p>
             <a:pPr lvl="1"/>
             <a:r>
-              <a:rPr lang="en-US" dirty="0" smtClean="0"/>
-              <a:t>p doesn't have to be close to the center– any value in [</a:t>
-            </a:r>
-            <a:r>
-              <a:rPr lang="en-US" dirty="0" err="1" smtClean="0"/>
+              <a:rPr lang="en-US" b="1" dirty="0" smtClean="0"/>
+              <a:t>p</a:t>
+            </a:r>
+            <a:r>
+              <a:rPr lang="en-US" dirty="0" smtClean="0"/>
+              <a:t> doesn't have to be close to the center– any value in [</a:t>
+            </a:r>
+            <a:r>
+              <a:rPr lang="en-US" b="1" dirty="0" err="1" smtClean="0"/>
               <a:t>lo,hi</a:t>
             </a:r>
             <a:r>
@@ -4131,7 +4724,31 @@
             <a:pPr lvl="1"/>
             <a:r>
               <a:rPr lang="en-US" dirty="0" smtClean="0"/>
-              <a:t>but choosing p to be near the center means that the search space is divided in half every time, so you'll only need about log(hi-lo) steps.</a:t>
+              <a:t>but choosing </a:t>
+            </a:r>
+            <a:r>
+              <a:rPr lang="en-US" b="1" dirty="0" smtClean="0"/>
+              <a:t>p</a:t>
+            </a:r>
+            <a:r>
+              <a:rPr lang="en-US" dirty="0" smtClean="0"/>
+              <a:t> to be near the center means that the search space is divided in half every time, so you'll only need about log(</a:t>
+            </a:r>
+            <a:r>
+              <a:rPr lang="en-US" b="1" dirty="0" smtClean="0"/>
+              <a:t>hi</a:t>
+            </a:r>
+            <a:r>
+              <a:rPr lang="en-US" dirty="0" smtClean="0"/>
+              <a:t>-</a:t>
+            </a:r>
+            <a:r>
+              <a:rPr lang="en-US" b="1" dirty="0" smtClean="0"/>
+              <a:t>lo</a:t>
+            </a:r>
+            <a:r>
+              <a:rPr lang="en-US" dirty="0" smtClean="0"/>
+              <a:t>) steps.</a:t>
             </a:r>
             <a:endParaRPr lang="en-US" dirty="0"/>
           </a:p>
@@ -4164,7 +4781,7 @@
     </p:spTree>
     <p:extLst>
       <p:ext uri="{BB962C8B-B14F-4D97-AF65-F5344CB8AC3E}">
-        <p14:creationId xmlns:p14="http://schemas.microsoft.com/office/powerpoint/2010/main" val="1483419217"/>
+        <p14:creationId xmlns:p14="http://schemas.microsoft.com/office/powerpoint/2010/main" val="315775351"/>
       </p:ext>
     </p:extLst>
   </p:cSld>
@@ -4252,7 +4869,15 @@
             <a:pPr lvl="1"/>
             <a:r>
               <a:rPr lang="en-US" dirty="0" smtClean="0"/>
-              <a:t>so we can rule out p, and all values less than p (because if p' &lt; p, f(p') &lt;= f(p) &lt; </a:t>
+              <a:t>so we can rule out p, and all values less than p (because if p' &lt; p, f(p') </a:t>
+            </a:r>
+            <a:r>
+              <a:rPr lang="en-US" dirty="0"/>
+              <a:t>≤ </a:t>
+            </a:r>
+            <a:r>
+              <a:rPr lang="en-US" dirty="0" smtClean="0"/>
+              <a:t>f(p) &lt; </a:t>
             </a:r>
             <a:r>
               <a:rPr lang="en-US" dirty="0" err="1" smtClean="0"/>
@@ -4292,7 +4917,15 @@
             </a:r>
             <a:r>
               <a:rPr lang="en-US" dirty="0" smtClean="0"/>
-              <a:t> &lt; f(p) &lt;= f(p').</a:t>
+              <a:t> &lt; f(p) </a:t>
+            </a:r>
+            <a:r>
+              <a:rPr lang="en-US" dirty="0"/>
+              <a:t>≤ </a:t>
+            </a:r>
+            <a:r>
+              <a:rPr lang="en-US" dirty="0" smtClean="0"/>
+              <a:t>f(p').</a:t>
             </a:r>
           </a:p>
           <a:p>
@@ -4348,7 +4981,7 @@
     </p:spTree>
     <p:extLst>
       <p:ext uri="{BB962C8B-B14F-4D97-AF65-F5344CB8AC3E}">
-        <p14:creationId xmlns:p14="http://schemas.microsoft.com/office/powerpoint/2010/main" val="3385272209"/>
+        <p14:creationId xmlns:p14="http://schemas.microsoft.com/office/powerpoint/2010/main" val="1769099270"/>
       </p:ext>
     </p:extLst>
   </p:cSld>
@@ -4479,7 +5112,23 @@
           <a:p>
             <a:r>
               <a:rPr lang="en-US" dirty="0"/>
-              <a:t>     (if (equal? (f lo) </a:t>
+              <a:t>     (if </a:t>
+            </a:r>
+            <a:r>
+              <a:rPr lang="en-US" dirty="0" smtClean="0"/>
+              <a:t>(</a:t>
+            </a:r>
+            <a:r>
+              <a:rPr lang="en-US" dirty="0"/>
+              <a:t>=</a:t>
+            </a:r>
+            <a:r>
+              <a:rPr lang="en-US" dirty="0" smtClean="0"/>
+              <a:t> </a:t>
+            </a:r>
+            <a:r>
+              <a:rPr lang="en-US" dirty="0"/>
+              <a:t>(f lo) </a:t>
             </a:r>
             <a:r>
               <a:rPr lang="en-US" dirty="0" err="1"/>
@@ -4499,14 +5148,35 @@
           <a:p>
             <a:r>
               <a:rPr lang="en-US" dirty="0"/>
-              <a:t>            ((define midpoint (floor (/ (+ lo hi) 2)))</a:t>
-            </a:r>
-          </a:p>
-          <a:p>
+              <a:t>            ((define </a:t>
+            </a:r>
+            <a:r>
+              <a:rPr lang="en-US" dirty="0" smtClean="0"/>
+              <a:t>p </a:t>
+            </a:r>
             <a:r>
               <a:rPr lang="en-US" dirty="0"/>
-              <a:t>             (define f-of-midpoint (f midpoint)))</a:t>
-            </a:r>
+              <a:t>(floor (/ (+ lo hi) 2)))</a:t>
+            </a:r>
+          </a:p>
+          <a:p>
+            <a:r>
+              <a:rPr lang="en-US" dirty="0"/>
+              <a:t>             (define </a:t>
+            </a:r>
+            <a:r>
+              <a:rPr lang="en-US" dirty="0" smtClean="0"/>
+              <a:t>f-of-midpoint </a:t>
+            </a:r>
+            <a:r>
+              <a:rPr lang="en-US" dirty="0"/>
+              <a:t>(f </a:t>
+            </a:r>
+            <a:r>
+              <a:rPr lang="en-US" dirty="0" smtClean="0"/>
+              <a:t>p)))</a:t>
+            </a:r>
+            <a:endParaRPr lang="en-US" dirty="0"/>
           </a:p>
           <a:p>
             <a:r>
@@ -4522,7 +5192,11 @@
           <a:p>
             <a:r>
               <a:rPr lang="en-US" dirty="0"/>
-              <a:t>              [(&lt; f-of-midpoint </a:t>
+              <a:t>              [(&lt; </a:t>
+            </a:r>
+            <a:r>
+              <a:rPr lang="en-US" dirty="0" smtClean="0"/>
+              <a:t>f-of-midpoint </a:t>
             </a:r>
             <a:r>
               <a:rPr lang="en-US" dirty="0" err="1"/>
@@ -4550,7 +5224,15 @@
           <a:p>
             <a:r>
               <a:rPr lang="en-US" dirty="0"/>
-              <a:t>               (binary-search-loop (+ midpoint 1) hi f </a:t>
+              <a:t>               (binary-search-loop (+ </a:t>
+            </a:r>
+            <a:r>
+              <a:rPr lang="en-US" dirty="0" smtClean="0"/>
+              <a:t>p </a:t>
+            </a:r>
+            <a:r>
+              <a:rPr lang="en-US" dirty="0"/>
+              <a:t>1) hi f </a:t>
             </a:r>
             <a:r>
               <a:rPr lang="en-US" dirty="0" err="1"/>
@@ -4592,7 +5274,15 @@
           <a:p>
             <a:r>
               <a:rPr lang="en-US" dirty="0"/>
-              <a:t>               (binary-search-loop lo (- midpoint 1) f </a:t>
+              <a:t>               (binary-search-loop lo (- </a:t>
+            </a:r>
+            <a:r>
+              <a:rPr lang="en-US" dirty="0" smtClean="0"/>
+              <a:t>p </a:t>
+            </a:r>
+            <a:r>
+              <a:rPr lang="en-US" dirty="0"/>
+              <a:t>1) f </a:t>
             </a:r>
             <a:r>
               <a:rPr lang="en-US" dirty="0" err="1"/>
@@ -4612,14 +5302,27 @@
           <a:p>
             <a:r>
               <a:rPr lang="en-US" dirty="0"/>
-              <a:t>                ;; midpoint is the one we're looking for</a:t>
-            </a:r>
-          </a:p>
-          <a:p>
+              <a:t>                ;; </a:t>
+            </a:r>
+            <a:r>
+              <a:rPr lang="en-US" dirty="0" smtClean="0"/>
+              <a:t>p </a:t>
+            </a:r>
             <a:r>
               <a:rPr lang="en-US" dirty="0"/>
-              <a:t>                midpoint]))]))</a:t>
-            </a:r>
+              <a:t>is the one we're looking for</a:t>
+            </a:r>
+          </a:p>
+          <a:p>
+            <a:r>
+              <a:rPr lang="en-US" dirty="0"/>
+              <a:t>                </a:t>
+            </a:r>
+            <a:r>
+              <a:rPr lang="en-US" dirty="0" smtClean="0"/>
+              <a:t>p]))]))</a:t>
+            </a:r>
+            <a:endParaRPr lang="en-US" dirty="0"/>
           </a:p>
         </p:txBody>
       </p:sp>
@@ -4650,7 +5353,7 @@
     </p:spTree>
     <p:extLst>
       <p:ext uri="{BB962C8B-B14F-4D97-AF65-F5344CB8AC3E}">
-        <p14:creationId xmlns:p14="http://schemas.microsoft.com/office/powerpoint/2010/main" val="3180151980"/>
+        <p14:creationId xmlns:p14="http://schemas.microsoft.com/office/powerpoint/2010/main" val="4129760149"/>
       </p:ext>
     </p:extLst>
   </p:cSld>
@@ -4850,6 +5553,30 @@
       </p:sp>
       <p:sp>
         <p:nvSpPr>
+          <p:cNvPr id="9" name="Slide Number Placeholder 8"/>
+          <p:cNvSpPr>
+            <a:spLocks noGrp="1"/>
+          </p:cNvSpPr>
+          <p:nvPr>
+            <p:ph type="sldNum" sz="quarter" idx="12"/>
+          </p:nvPr>
+        </p:nvSpPr>
+        <p:spPr/>
+        <p:txBody>
+          <a:bodyPr/>
+          <a:lstStyle/>
+          <a:p>
+            <a:fld id="{9F4492BD-6A9C-48FC-AC76-0B4FE11194A1}" type="slidenum">
+              <a:rPr lang="en-US" smtClean="0"/>
+              <a:pPr/>
+              <a:t>13</a:t>
+            </a:fld>
+            <a:endParaRPr lang="en-US"/>
+          </a:p>
+        </p:txBody>
+      </p:sp>
+      <p:sp>
+        <p:nvSpPr>
           <p:cNvPr id="4" name="TextBox 3"/>
           <p:cNvSpPr txBox="1"/>
           <p:nvPr/>
@@ -4857,7 +5584,7 @@
         <p:spPr>
           <a:xfrm>
             <a:off x="7391400" y="2051566"/>
-            <a:ext cx="1492203" cy="369332"/>
+            <a:ext cx="761747" cy="369332"/>
           </a:xfrm>
           <a:prstGeom prst="rect">
             <a:avLst/>
@@ -4877,7 +5604,7 @@
           <a:p>
             <a:r>
               <a:rPr lang="en-US" dirty="0" smtClean="0"/>
-              <a:t>midpoint = 20</a:t>
+              <a:t>p = 20</a:t>
             </a:r>
             <a:endParaRPr lang="en-US" dirty="0"/>
           </a:p>
@@ -4892,7 +5619,7 @@
         <p:spPr>
           <a:xfrm>
             <a:off x="7455520" y="2971800"/>
-            <a:ext cx="1428083" cy="369332"/>
+            <a:ext cx="697627" cy="369332"/>
           </a:xfrm>
           <a:prstGeom prst="rect">
             <a:avLst/>
@@ -4912,7 +5639,7 @@
           <a:p>
             <a:r>
               <a:rPr lang="en-US" dirty="0" smtClean="0"/>
-              <a:t>midpoint = 9 </a:t>
+              <a:t>p = 9 </a:t>
             </a:r>
             <a:endParaRPr lang="en-US" dirty="0"/>
           </a:p>
@@ -4927,7 +5654,7 @@
         <p:spPr>
           <a:xfrm>
             <a:off x="7455520" y="3733800"/>
-            <a:ext cx="1428083" cy="369332"/>
+            <a:ext cx="697627" cy="369332"/>
           </a:xfrm>
           <a:prstGeom prst="rect">
             <a:avLst/>
@@ -4947,7 +5674,7 @@
           <a:p>
             <a:r>
               <a:rPr lang="en-US" dirty="0" smtClean="0"/>
-              <a:t>midpoint = 4 </a:t>
+              <a:t>p = 4 </a:t>
             </a:r>
             <a:endParaRPr lang="en-US" dirty="0"/>
           </a:p>
@@ -4962,7 +5689,7 @@
         <p:spPr>
           <a:xfrm>
             <a:off x="7423459" y="4495800"/>
-            <a:ext cx="1428083" cy="369332"/>
+            <a:ext cx="697627" cy="369332"/>
           </a:xfrm>
           <a:prstGeom prst="rect">
             <a:avLst/>
@@ -4982,7 +5709,7 @@
           <a:p>
             <a:r>
               <a:rPr lang="en-US" dirty="0" smtClean="0"/>
-              <a:t>midpoint = 6 </a:t>
+              <a:t>p = 6 </a:t>
             </a:r>
             <a:endParaRPr lang="en-US" dirty="0"/>
           </a:p>
@@ -4997,7 +5724,7 @@
         <p:spPr>
           <a:xfrm>
             <a:off x="7423459" y="5257800"/>
-            <a:ext cx="1428083" cy="369332"/>
+            <a:ext cx="697627" cy="369332"/>
           </a:xfrm>
           <a:prstGeom prst="rect">
             <a:avLst/>
@@ -5017,40 +5744,16 @@
           <a:p>
             <a:r>
               <a:rPr lang="en-US" dirty="0" smtClean="0"/>
-              <a:t>midpoint = 7 </a:t>
+              <a:t>p = 7 </a:t>
             </a:r>
             <a:endParaRPr lang="en-US" dirty="0"/>
-          </a:p>
-        </p:txBody>
-      </p:sp>
-      <p:sp>
-        <p:nvSpPr>
-          <p:cNvPr id="9" name="Slide Number Placeholder 8"/>
-          <p:cNvSpPr>
-            <a:spLocks noGrp="1"/>
-          </p:cNvSpPr>
-          <p:nvPr>
-            <p:ph type="sldNum" sz="quarter" idx="12"/>
-          </p:nvPr>
-        </p:nvSpPr>
-        <p:spPr/>
-        <p:txBody>
-          <a:bodyPr/>
-          <a:lstStyle/>
-          <a:p>
-            <a:fld id="{9F4492BD-6A9C-48FC-AC76-0B4FE11194A1}" type="slidenum">
-              <a:rPr lang="en-US" smtClean="0"/>
-              <a:pPr/>
-              <a:t>13</a:t>
-            </a:fld>
-            <a:endParaRPr lang="en-US"/>
           </a:p>
         </p:txBody>
       </p:sp>
     </p:spTree>
     <p:extLst>
       <p:ext uri="{BB962C8B-B14F-4D97-AF65-F5344CB8AC3E}">
-        <p14:creationId xmlns:p14="http://schemas.microsoft.com/office/powerpoint/2010/main" val="982954173"/>
+        <p14:creationId xmlns:p14="http://schemas.microsoft.com/office/powerpoint/2010/main" val="498782498"/>
       </p:ext>
     </p:extLst>
   </p:cSld>
@@ -5094,7 +5797,7 @@
           <a:p>
             <a:r>
               <a:rPr lang="en-US" dirty="0" smtClean="0"/>
-              <a:t>What's the termination argument?</a:t>
+              <a:t>What's the halting measure?</a:t>
             </a:r>
             <a:endParaRPr lang="en-US" dirty="0"/>
           </a:p>
@@ -5112,32 +5815,58 @@
         </p:nvSpPr>
         <p:spPr/>
         <p:txBody>
-          <a:bodyPr/>
-          <a:lstStyle/>
-          <a:p>
-            <a:r>
-              <a:rPr lang="en-US" dirty="0" smtClean="0"/>
-              <a:t>If </a:t>
-            </a:r>
+          <a:bodyPr>
+            <a:normAutofit fontScale="92500" lnSpcReduction="20000"/>
+          </a:bodyPr>
+          <a:lstStyle/>
+          <a:p>
+            <a:r>
+              <a:rPr lang="en-US" dirty="0" smtClean="0"/>
+              <a:t>Proposed halting measure: max(0,hi-lo)</a:t>
+            </a:r>
+          </a:p>
+          <a:p>
+            <a:pPr lvl="1"/>
+            <a:r>
+              <a:rPr lang="en-US" dirty="0" smtClean="0"/>
+              <a:t>(the size of the search region)</a:t>
+            </a:r>
+          </a:p>
+          <a:p>
+            <a:r>
+              <a:rPr lang="en-US" dirty="0" smtClean="0"/>
+              <a:t>Termination argument:</a:t>
+            </a:r>
+          </a:p>
+          <a:p>
+            <a:pPr lvl="1"/>
+            <a:r>
+              <a:rPr lang="en-US" dirty="0" smtClean="0"/>
+              <a:t>max(0,hi-lo) is always a non-negative integer</a:t>
+            </a:r>
+          </a:p>
+          <a:p>
+            <a:pPr lvl="1"/>
+            <a:r>
+              <a:rPr lang="en-US" dirty="0" smtClean="0"/>
+              <a:t>Must check to see that max(0,hi-lo) decreases on every recursive call.</a:t>
+            </a:r>
+          </a:p>
+          <a:p>
+            <a:pPr lvl="2"/>
+            <a:r>
+              <a:rPr lang="en-US" dirty="0" smtClean="0"/>
+              <a:t>At every recursive call, the size of the search region decreases by at least 1 (because p is removed from the search region).</a:t>
+            </a:r>
+          </a:p>
+          <a:p>
             <a:r>
               <a:rPr lang="en-US" dirty="0"/>
-              <a:t>lo &gt; hi, the function </a:t>
-            </a:r>
-            <a:r>
-              <a:rPr lang="en-US" dirty="0" smtClean="0"/>
-              <a:t>terminates immediately. </a:t>
-            </a:r>
-            <a:r>
-              <a:rPr lang="en-US" dirty="0"/>
-              <a:t>Otherwise (- hi lo) decreases at every </a:t>
-            </a:r>
-            <a:r>
-              <a:rPr lang="en-US" dirty="0" smtClean="0"/>
-              <a:t>recursive </a:t>
-            </a:r>
-            <a:r>
-              <a:rPr lang="en-US" dirty="0"/>
-              <a:t>call.</a:t>
+              <a:t>So max(0,hi-lo</a:t>
+            </a:r>
+            <a:r>
+              <a:rPr lang="en-US" dirty="0" smtClean="0"/>
+              <a:t>) is a halting measure for binary-search-loop.</a:t>
             </a:r>
           </a:p>
         </p:txBody>
@@ -5169,7 +5898,7 @@
     </p:spTree>
     <p:extLst>
       <p:ext uri="{BB962C8B-B14F-4D97-AF65-F5344CB8AC3E}">
-        <p14:creationId xmlns:p14="http://schemas.microsoft.com/office/powerpoint/2010/main" val="1137726526"/>
+        <p14:creationId xmlns:p14="http://schemas.microsoft.com/office/powerpoint/2010/main" val="3641683565"/>
       </p:ext>
     </p:extLst>
   </p:cSld>
@@ -5277,6 +6006,13 @@
             <a:pPr lvl="1"/>
             <a:r>
               <a:rPr lang="en-US" dirty="0" smtClean="0"/>
+              <a:t>give the halting measure and explain the termination argument for binary search</a:t>
+            </a:r>
+          </a:p>
+          <a:p>
+            <a:pPr lvl="1"/>
+            <a:r>
+              <a:rPr lang="en-US" dirty="0" smtClean="0"/>
               <a:t>write variations on a binary search function</a:t>
             </a:r>
             <a:endParaRPr lang="en-US" dirty="0"/>
@@ -5310,7 +6046,7 @@
     </p:spTree>
     <p:extLst>
       <p:ext uri="{BB962C8B-B14F-4D97-AF65-F5344CB8AC3E}">
-        <p14:creationId xmlns:p14="http://schemas.microsoft.com/office/powerpoint/2010/main" val="4211700304"/>
+        <p14:creationId xmlns:p14="http://schemas.microsoft.com/office/powerpoint/2010/main" val="1174789038"/>
       </p:ext>
     </p:extLst>
   </p:cSld>
@@ -5384,32 +6120,25 @@
           <a:p>
             <a:r>
               <a:rPr lang="en-US" dirty="0" smtClean="0"/>
-              <a:t>If you have questions about this lesson, ask them on the Discussion </a:t>
-            </a:r>
-            <a:r>
-              <a:rPr lang="en-US" dirty="0" smtClean="0"/>
-              <a:t>Board</a:t>
-            </a:r>
-          </a:p>
-          <a:p>
-            <a:r>
-              <a:rPr lang="en-US" dirty="0" smtClean="0"/>
-              <a:t>Do </a:t>
-            </a:r>
-            <a:r>
-              <a:rPr lang="en-US" smtClean="0"/>
-              <a:t>Guided Practice 8.3</a:t>
-            </a:r>
-            <a:endParaRPr lang="en-US" smtClean="0"/>
-          </a:p>
-          <a:p>
-            <a:r>
-              <a:rPr lang="en-US" dirty="0" smtClean="0"/>
-              <a:t>Go </a:t>
-            </a:r>
-            <a:r>
-              <a:rPr lang="en-US" dirty="0" smtClean="0"/>
-              <a:t>on to the next lesson</a:t>
+              <a:t>Study the file 08-6-binary-search.rkt in the Examples folder</a:t>
+            </a:r>
+          </a:p>
+          <a:p>
+            <a:r>
+              <a:rPr lang="en-US" dirty="0" smtClean="0"/>
+              <a:t>If you have questions about this lesson, ask them on the Discussion Board</a:t>
+            </a:r>
+          </a:p>
+          <a:p>
+            <a:r>
+              <a:rPr lang="en-US" dirty="0" smtClean="0"/>
+              <a:t>Do Guided Practice 8.3</a:t>
+            </a:r>
+          </a:p>
+          <a:p>
+            <a:r>
+              <a:rPr lang="en-US" dirty="0" smtClean="0"/>
+              <a:t>Go on to the next lesson</a:t>
             </a:r>
             <a:endParaRPr lang="en-US" dirty="0"/>
           </a:p>
@@ -5442,7 +6171,7 @@
     </p:spTree>
     <p:extLst>
       <p:ext uri="{BB962C8B-B14F-4D97-AF65-F5344CB8AC3E}">
-        <p14:creationId xmlns:p14="http://schemas.microsoft.com/office/powerpoint/2010/main" val="2206922053"/>
+        <p14:creationId xmlns:p14="http://schemas.microsoft.com/office/powerpoint/2010/main" val="1758776814"/>
       </p:ext>
     </p:extLst>
   </p:cSld>
@@ -5478,6 +6207,31 @@
       </p:grpSpPr>
       <p:sp>
         <p:nvSpPr>
+          <p:cNvPr id="4" name="Title 3"/>
+          <p:cNvSpPr>
+            <a:spLocks noGrp="1"/>
+          </p:cNvSpPr>
+          <p:nvPr>
+            <p:ph type="title"/>
+          </p:nvPr>
+        </p:nvSpPr>
+        <p:spPr>
+          <a:noFill/>
+        </p:spPr>
+        <p:txBody>
+          <a:bodyPr/>
+          <a:lstStyle/>
+          <a:p>
+            <a:r>
+              <a:rPr lang="en-US" dirty="0" smtClean="0"/>
+              <a:t>Introduction</a:t>
+            </a:r>
+            <a:endParaRPr lang="en-US" dirty="0"/>
+          </a:p>
+        </p:txBody>
+      </p:sp>
+      <p:sp>
+        <p:nvSpPr>
           <p:cNvPr id="3" name="Content Placeholder 2"/>
           <p:cNvSpPr>
             <a:spLocks noGrp="1"/>
@@ -5509,31 +6263,6 @@
       </p:sp>
       <p:sp>
         <p:nvSpPr>
-          <p:cNvPr id="4" name="Title 3"/>
-          <p:cNvSpPr>
-            <a:spLocks noGrp="1"/>
-          </p:cNvSpPr>
-          <p:nvPr>
-            <p:ph type="title"/>
-          </p:nvPr>
-        </p:nvSpPr>
-        <p:spPr>
-          <a:noFill/>
-        </p:spPr>
-        <p:txBody>
-          <a:bodyPr/>
-          <a:lstStyle/>
-          <a:p>
-            <a:r>
-              <a:rPr lang="en-US" dirty="0" smtClean="0"/>
-              <a:t>Introduction</a:t>
-            </a:r>
-            <a:endParaRPr lang="en-US" dirty="0"/>
-          </a:p>
-        </p:txBody>
-      </p:sp>
-      <p:sp>
-        <p:nvSpPr>
           <p:cNvPr id="2" name="Slide Number Placeholder 1"/>
           <p:cNvSpPr>
             <a:spLocks noGrp="1"/>
@@ -5557,6 +6286,11 @@
         </p:txBody>
       </p:sp>
     </p:spTree>
+    <p:extLst>
+      <p:ext uri="{BB962C8B-B14F-4D97-AF65-F5344CB8AC3E}">
+        <p14:creationId xmlns:p14="http://schemas.microsoft.com/office/powerpoint/2010/main" val="3102963154"/>
+      </p:ext>
+    </p:extLst>
   </p:cSld>
   <p:clrMapOvr>
     <a:masterClrMapping/>
@@ -5693,7 +6427,7 @@
     </p:spTree>
     <p:extLst>
       <p:ext uri="{BB962C8B-B14F-4D97-AF65-F5344CB8AC3E}">
-        <p14:creationId xmlns:p14="http://schemas.microsoft.com/office/powerpoint/2010/main" val="3844163991"/>
+        <p14:creationId xmlns:p14="http://schemas.microsoft.com/office/powerpoint/2010/main" val="2604415503"/>
       </p:ext>
     </p:extLst>
   </p:cSld>
@@ -5848,7 +6582,7 @@
     </p:spTree>
     <p:extLst>
       <p:ext uri="{BB962C8B-B14F-4D97-AF65-F5344CB8AC3E}">
-        <p14:creationId xmlns:p14="http://schemas.microsoft.com/office/powerpoint/2010/main" val="296299893"/>
+        <p14:creationId xmlns:p14="http://schemas.microsoft.com/office/powerpoint/2010/main" val="1841173485"/>
       </p:ext>
     </p:extLst>
   </p:cSld>
@@ -5941,13 +6675,8 @@
             </a:pPr>
             <a:r>
               <a:rPr lang="en-US" b="1" dirty="0" smtClean="0"/>
-              <a:t>f : [0..N] -&gt; </a:t>
-            </a:r>
-            <a:r>
-              <a:rPr lang="en-US" b="1" dirty="0" smtClean="0"/>
-              <a:t>Integer</a:t>
-            </a:r>
-            <a:endParaRPr lang="en-US" b="1" dirty="0" smtClean="0"/>
+              <a:t>f : [0..N] -&gt; Integer</a:t>
+            </a:r>
           </a:p>
           <a:p>
             <a:pPr marL="400050" lvl="1" indent="0">
@@ -5975,7 +6704,7 @@
             </a:r>
             <a:r>
               <a:rPr lang="en-US" b="1" dirty="0" smtClean="0"/>
-              <a:t> &lt;= j implies f(</a:t>
+              <a:t> ≤ j implies f(</a:t>
             </a:r>
             <a:r>
               <a:rPr lang="en-US" b="1" dirty="0" err="1" smtClean="0"/>
@@ -5983,7 +6712,7 @@
             </a:r>
             <a:r>
               <a:rPr lang="en-US" b="1" dirty="0" smtClean="0"/>
-              <a:t>) &lt;= f(j)</a:t>
+              <a:t>) ≤ f(j)</a:t>
             </a:r>
             <a:endParaRPr lang="en-US" b="1" dirty="0"/>
           </a:p>
@@ -6016,7 +6745,7 @@
     </p:spTree>
     <p:extLst>
       <p:ext uri="{BB962C8B-B14F-4D97-AF65-F5344CB8AC3E}">
-        <p14:creationId xmlns:p14="http://schemas.microsoft.com/office/powerpoint/2010/main" val="3314103868"/>
+        <p14:creationId xmlns:p14="http://schemas.microsoft.com/office/powerpoint/2010/main" val="3546254244"/>
       </p:ext>
     </p:extLst>
   </p:cSld>
@@ -6123,7 +6852,7 @@
     </p:spTree>
     <p:extLst>
       <p:ext uri="{BB962C8B-B14F-4D97-AF65-F5344CB8AC3E}">
-        <p14:creationId xmlns:p14="http://schemas.microsoft.com/office/powerpoint/2010/main" val="248886524"/>
+        <p14:creationId xmlns:p14="http://schemas.microsoft.com/office/powerpoint/2010/main" val="4186944835"/>
       </p:ext>
     </p:extLst>
   </p:cSld>
@@ -6190,12 +6919,7 @@
             <p:ph idx="1"/>
           </p:nvPr>
         </p:nvSpPr>
-        <p:spPr>
-          <a:xfrm>
-            <a:off x="457200" y="1600200"/>
-            <a:ext cx="8686800" cy="4525963"/>
-          </a:xfrm>
-        </p:spPr>
+        <p:spPr/>
         <p:txBody>
           <a:bodyPr>
             <a:normAutofit/>
@@ -6248,11 +6972,7 @@
             </a:pPr>
             <a:r>
               <a:rPr lang="en-US" sz="2400" dirty="0" smtClean="0"/>
-              <a:t>;;    </a:t>
-            </a:r>
-            <a:r>
-              <a:rPr lang="en-US" sz="2400" dirty="0" smtClean="0"/>
-              <a:t>(</a:t>
+              <a:t>;;    (</a:t>
             </a:r>
             <a:r>
               <a:rPr lang="en-US" sz="2400" dirty="0" err="1" smtClean="0"/>
@@ -6279,11 +6999,7 @@
             </a:pPr>
             <a:r>
               <a:rPr lang="en-US" sz="2400" dirty="0" smtClean="0"/>
-              <a:t>;;    </a:t>
-            </a:r>
-            <a:r>
-              <a:rPr lang="en-US" sz="2400" dirty="0" smtClean="0"/>
-              <a:t>Integer</a:t>
+              <a:t>;;    Integer</a:t>
             </a:r>
           </a:p>
           <a:p>
@@ -6294,19 +7010,11 @@
             </a:pPr>
             <a:r>
               <a:rPr lang="en-US" sz="2400" dirty="0" smtClean="0"/>
-              <a:t>;;    </a:t>
-            </a:r>
-            <a:r>
-              <a:rPr lang="en-US" sz="2400" dirty="0" smtClean="0"/>
-              <a:t>-&gt; </a:t>
+              <a:t>;;    -&gt; </a:t>
             </a:r>
             <a:r>
               <a:rPr lang="en-US" sz="2400" dirty="0" err="1" smtClean="0"/>
-              <a:t>Maybe</a:t>
-            </a:r>
-            <a:r>
-              <a:rPr lang="en-US" sz="2400" dirty="0" err="1" smtClean="0"/>
-              <a:t>NonNegInt</a:t>
+              <a:t>MaybeNonNegInt</a:t>
             </a:r>
             <a:endParaRPr lang="en-US" sz="2400" dirty="0"/>
           </a:p>
@@ -6376,20 +7084,28 @@
               <a:t>, </a:t>
             </a:r>
             <a:r>
+              <a:rPr lang="en-US" sz="2400" dirty="0" err="1" smtClean="0"/>
+              <a:t>i≤j</a:t>
+            </a:r>
+            <a:r>
+              <a:rPr lang="en-US" sz="2400" dirty="0" smtClean="0"/>
+              <a:t> </a:t>
+            </a:r>
+            <a:r>
+              <a:rPr lang="en-US" sz="2400" dirty="0"/>
+              <a:t>implies f(</a:t>
+            </a:r>
+            <a:r>
               <a:rPr lang="en-US" sz="2400" dirty="0" err="1"/>
               <a:t>i</a:t>
             </a:r>
             <a:r>
+              <a:rPr lang="en-US" sz="2400" dirty="0" smtClean="0"/>
+              <a:t>)≤f(j</a:t>
+            </a:r>
+            <a:r>
               <a:rPr lang="en-US" sz="2400" dirty="0"/>
-              <a:t>&lt;=j implies f(</a:t>
-            </a:r>
-            <a:r>
-              <a:rPr lang="en-US" sz="2400" dirty="0" err="1"/>
-              <a:t>i</a:t>
-            </a:r>
-            <a:r>
-              <a:rPr lang="en-US" sz="2400" dirty="0"/>
-              <a:t>) &lt;= f(j))</a:t>
+              <a:t>))</a:t>
             </a:r>
           </a:p>
           <a:p>
@@ -6400,7 +7116,7 @@
             </a:pPr>
             <a:r>
               <a:rPr lang="en-US" sz="2400" dirty="0"/>
-              <a:t>;; RETURNS: a number k such that lo &lt;= k &lt;= hi </a:t>
+              <a:t>;; RETURNS: a number k such that lo ≤ k ≤ hi </a:t>
             </a:r>
             <a:endParaRPr lang="en-US" sz="2400" dirty="0" smtClean="0"/>
           </a:p>
@@ -6475,7 +7191,7 @@
     </p:spTree>
     <p:extLst>
       <p:ext uri="{BB962C8B-B14F-4D97-AF65-F5344CB8AC3E}">
-        <p14:creationId xmlns:p14="http://schemas.microsoft.com/office/powerpoint/2010/main" val="2201247952"/>
+        <p14:creationId xmlns:p14="http://schemas.microsoft.com/office/powerpoint/2010/main" val="590854489"/>
       </p:ext>
     </p:extLst>
   </p:cSld>
@@ -6551,6 +7267,11 @@
           </a:bodyPr>
           <a:lstStyle/>
           <a:p>
+            <a:pPr>
+              <a:spcBef>
+                <a:spcPts val="0"/>
+              </a:spcBef>
+            </a:pPr>
             <a:r>
               <a:rPr lang="en-US" sz="2000" dirty="0"/>
               <a:t>;; binary-search </a:t>
@@ -6561,6 +7282,11 @@
             </a:r>
           </a:p>
           <a:p>
+            <a:pPr>
+              <a:spcBef>
+                <a:spcPts val="0"/>
+              </a:spcBef>
+            </a:pPr>
             <a:r>
               <a:rPr lang="en-US" sz="2000" dirty="0" smtClean="0"/>
               <a:t>;;  </a:t>
@@ -6591,13 +7317,14 @@
             </a:r>
           </a:p>
           <a:p>
+            <a:pPr>
+              <a:spcBef>
+                <a:spcPts val="0"/>
+              </a:spcBef>
+            </a:pPr>
             <a:r>
               <a:rPr lang="en-US" sz="2000" dirty="0" smtClean="0"/>
-              <a:t>;;  </a:t>
-            </a:r>
-            <a:r>
-              <a:rPr lang="en-US" sz="2000" dirty="0" smtClean="0"/>
-              <a:t>-&gt; </a:t>
+              <a:t>;;  -&gt; </a:t>
             </a:r>
             <a:r>
               <a:rPr lang="en-US" sz="2000" dirty="0" err="1" smtClean="0"/>
@@ -6606,6 +7333,11 @@
             <a:endParaRPr lang="en-US" sz="2000" dirty="0"/>
           </a:p>
           <a:p>
+            <a:pPr>
+              <a:spcBef>
+                <a:spcPts val="0"/>
+              </a:spcBef>
+            </a:pPr>
             <a:r>
               <a:rPr lang="en-US" sz="2000" dirty="0"/>
               <a:t>;; GIVEN: a number N, </a:t>
@@ -6613,13 +7345,14 @@
             <a:endParaRPr lang="en-US" sz="2000" dirty="0" smtClean="0"/>
           </a:p>
           <a:p>
+            <a:pPr>
+              <a:spcBef>
+                <a:spcPts val="0"/>
+              </a:spcBef>
+            </a:pPr>
             <a:r>
               <a:rPr lang="en-US" sz="2000" dirty="0" smtClean="0"/>
-              <a:t>;;  </a:t>
-            </a:r>
-            <a:r>
-              <a:rPr lang="en-US" sz="2000" dirty="0" smtClean="0"/>
-              <a:t>a </a:t>
+              <a:t>;;  a </a:t>
             </a:r>
             <a:r>
               <a:rPr lang="en-US" sz="2000" dirty="0"/>
@@ -6641,16 +7374,16 @@
               <a:rPr lang="en-US" sz="2000" dirty="0" smtClean="0"/>
               <a:t>Integer,</a:t>
             </a:r>
-            <a:endParaRPr lang="en-US" sz="2000" dirty="0" smtClean="0"/>
-          </a:p>
-          <a:p>
+          </a:p>
+          <a:p>
+            <a:pPr>
+              <a:spcBef>
+                <a:spcPts val="0"/>
+              </a:spcBef>
+            </a:pPr>
             <a:r>
               <a:rPr lang="en-US" sz="2000" dirty="0" smtClean="0"/>
-              <a:t>;; </a:t>
-            </a:r>
-            <a:r>
-              <a:rPr lang="en-US" sz="2000" dirty="0" smtClean="0"/>
-              <a:t> and </a:t>
+              <a:t>;;  and </a:t>
             </a:r>
             <a:r>
               <a:rPr lang="en-US" sz="2000" dirty="0"/>
@@ -6663,6 +7396,11 @@
             <a:endParaRPr lang="en-US" sz="2000" dirty="0"/>
           </a:p>
           <a:p>
+            <a:pPr>
+              <a:spcBef>
+                <a:spcPts val="0"/>
+              </a:spcBef>
+            </a:pPr>
             <a:r>
               <a:rPr lang="en-US" sz="2000" dirty="0"/>
               <a:t>;; WHERE: f is monotonic (</a:t>
@@ -6681,7 +7419,7 @@
             </a:r>
             <a:r>
               <a:rPr lang="en-US" sz="2000" dirty="0"/>
-              <a:t>&lt;=j implies f(</a:t>
+              <a:t> ≤ j implies f(</a:t>
             </a:r>
             <a:r>
               <a:rPr lang="en-US" sz="2000" dirty="0" err="1"/>
@@ -6689,17 +7427,27 @@
             </a:r>
             <a:r>
               <a:rPr lang="en-US" sz="2000" dirty="0"/>
-              <a:t>) &lt;= f(j))</a:t>
-            </a:r>
-          </a:p>
-          <a:p>
+              <a:t>) ≤ f(j))</a:t>
+            </a:r>
+          </a:p>
+          <a:p>
+            <a:pPr>
+              <a:spcBef>
+                <a:spcPts val="0"/>
+              </a:spcBef>
+            </a:pPr>
             <a:r>
               <a:rPr lang="en-US" sz="2000" dirty="0"/>
-              <a:t>;; RETURNS: a number k such that 0 &lt;= k &lt;= N </a:t>
+              <a:t>;; RETURNS: a number k such that 0 ≤ k ≤ N </a:t>
             </a:r>
             <a:endParaRPr lang="en-US" sz="2000" dirty="0" smtClean="0"/>
           </a:p>
           <a:p>
+            <a:pPr>
+              <a:spcBef>
+                <a:spcPts val="0"/>
+              </a:spcBef>
+            </a:pPr>
             <a:r>
               <a:rPr lang="en-US" sz="2000" dirty="0" smtClean="0"/>
               <a:t>;;  and </a:t>
@@ -6718,6 +7466,11 @@
             </a:r>
           </a:p>
           <a:p>
+            <a:pPr>
+              <a:spcBef>
+                <a:spcPts val="0"/>
+              </a:spcBef>
+            </a:pPr>
             <a:r>
               <a:rPr lang="en-US" sz="2000" dirty="0"/>
               <a:t>;; </a:t>
@@ -6732,15 +7485,35 @@
             </a:r>
           </a:p>
           <a:p>
+            <a:pPr>
+              <a:spcBef>
+                <a:spcPts val="0"/>
+              </a:spcBef>
+            </a:pPr>
             <a:endParaRPr lang="en-US" sz="2000" dirty="0"/>
           </a:p>
           <a:p>
+            <a:pPr>
+              <a:spcBef>
+                <a:spcPts val="0"/>
+              </a:spcBef>
+            </a:pPr>
             <a:r>
               <a:rPr lang="en-US" sz="2000" dirty="0"/>
-              <a:t>;; STRATEGY: functional composition</a:t>
-            </a:r>
-          </a:p>
-          <a:p>
+              <a:t>;; STRATEGY: </a:t>
+            </a:r>
+            <a:r>
+              <a:rPr lang="en-US" sz="2000" dirty="0" smtClean="0"/>
+              <a:t>call a more general function</a:t>
+            </a:r>
+            <a:endParaRPr lang="en-US" sz="2000" dirty="0"/>
+          </a:p>
+          <a:p>
+            <a:pPr>
+              <a:spcBef>
+                <a:spcPts val="0"/>
+              </a:spcBef>
+            </a:pPr>
             <a:r>
               <a:rPr lang="en-US" sz="2000" dirty="0"/>
               <a:t>(define (binary-search N f </a:t>
@@ -6755,6 +7528,11 @@
             </a:r>
           </a:p>
           <a:p>
+            <a:pPr>
+              <a:spcBef>
+                <a:spcPts val="0"/>
+              </a:spcBef>
+            </a:pPr>
             <a:r>
               <a:rPr lang="en-US" sz="2000" dirty="0"/>
               <a:t>  (binary-search-loop 0 N f </a:t>
@@ -6797,7 +7575,7 @@
     </p:spTree>
     <p:extLst>
       <p:ext uri="{BB962C8B-B14F-4D97-AF65-F5344CB8AC3E}">
-        <p14:creationId xmlns:p14="http://schemas.microsoft.com/office/powerpoint/2010/main" val="2606347644"/>
+        <p14:creationId xmlns:p14="http://schemas.microsoft.com/office/powerpoint/2010/main" val="766434309"/>
       </p:ext>
     </p:extLst>
   </p:cSld>
@@ -6873,15 +7651,31 @@
           <a:p>
             <a:r>
               <a:rPr lang="en-US" dirty="0" smtClean="0"/>
-              <a:t>if lo&gt;hi, the search range [</a:t>
-            </a:r>
-            <a:r>
-              <a:rPr lang="en-US" dirty="0" err="1" smtClean="0"/>
+              <a:t>if </a:t>
+            </a:r>
+            <a:r>
+              <a:rPr lang="en-US" b="1" dirty="0" smtClean="0"/>
+              <a:t>lo&gt;hi</a:t>
+            </a:r>
+            <a:r>
+              <a:rPr lang="en-US" dirty="0" smtClean="0"/>
+              <a:t>, the search range </a:t>
+            </a:r>
+            <a:r>
+              <a:rPr lang="en-US" b="1" dirty="0" smtClean="0"/>
+              <a:t>[</a:t>
+            </a:r>
+            <a:r>
+              <a:rPr lang="en-US" b="1" dirty="0" err="1" smtClean="0"/>
               <a:t>lo,hi</a:t>
             </a:r>
             <a:r>
-              <a:rPr lang="en-US" dirty="0" smtClean="0"/>
-              <a:t>] is empty, so the answer must be </a:t>
+              <a:rPr lang="en-US" b="1" dirty="0" smtClean="0"/>
+              <a:t>] </a:t>
+            </a:r>
+            <a:r>
+              <a:rPr lang="en-US" dirty="0" smtClean="0"/>
+              <a:t>is empty, so the answer must be </a:t>
             </a:r>
             <a:r>
               <a:rPr lang="en-US" b="1" dirty="0" smtClean="0"/>
@@ -6895,7 +7689,15 @@
           <a:p>
             <a:r>
               <a:rPr lang="en-US" dirty="0" smtClean="0"/>
-              <a:t>if lo=hi, the search range has size 1, so it's easy to figure out the answer.</a:t>
+              <a:t>if </a:t>
+            </a:r>
+            <a:r>
+              <a:rPr lang="en-US" b="1" dirty="0" smtClean="0"/>
+              <a:t>lo=hi</a:t>
+            </a:r>
+            <a:r>
+              <a:rPr lang="en-US" dirty="0" smtClean="0"/>
+              <a:t>, the search range has size 1, so it's easy to figure out the answer.</a:t>
             </a:r>
           </a:p>
           <a:p>
@@ -6933,7 +7735,7 @@
     </p:spTree>
     <p:extLst>
       <p:ext uri="{BB962C8B-B14F-4D97-AF65-F5344CB8AC3E}">
-        <p14:creationId xmlns:p14="http://schemas.microsoft.com/office/powerpoint/2010/main" val="453155891"/>
+        <p14:creationId xmlns:p14="http://schemas.microsoft.com/office/powerpoint/2010/main" val="1954973266"/>
       </p:ext>
     </p:extLst>
   </p:cSld>
@@ -6952,8 +7754,7 @@
 
 <file path=ppt/tags/tag1.xml><?xml version="1.0" encoding="utf-8"?>
 <p:tagLst xmlns:a="http://schemas.openxmlformats.org/drawingml/2006/main" xmlns:r="http://schemas.openxmlformats.org/officeDocument/2006/relationships" xmlns:p="http://schemas.openxmlformats.org/presentationml/2006/main">
-  <p:tag name="ISPRING_RESOURCE_PATHS_HASH_2" val="a715c3e2e12397255096108cd2b177977f90a6"/>
-  <p:tag name="ISPRING_RESOURCE_PATHS_HASH_PRESENTER" val="c81023c46f555efdbfefa9711b4fc011c2607851"/>
+  <p:tag name="ISPRING_RESOURCE_PATHS_HASH_PRESENTER" val="876fc126d3114d2cd7af425e30d91d1d47f77022"/>
 </p:tagLst>
 </file>
 
@@ -6964,7 +7765,7 @@
 </file>
 
 <file path=ppt/theme/theme1.xml><?xml version="1.0" encoding="utf-8"?>
-<a:theme xmlns:a="http://schemas.openxmlformats.org/drawingml/2006/main" name="Office Theme">
+<a:theme xmlns:a="http://schemas.openxmlformats.org/drawingml/2006/main" name="1_Office Theme">
   <a:themeElements>
     <a:clrScheme name="Office">
       <a:dk1>
@@ -7038,6 +7839,7 @@
         <a:font script="Mong" typeface="Mongolian Baiti"/>
         <a:font script="Viet" typeface="Times New Roman"/>
         <a:font script="Uigh" typeface="Microsoft Uighur"/>
+        <a:font script="Geor" typeface="Sylfaen"/>
       </a:majorFont>
       <a:minorFont>
         <a:latin typeface="Calibri"/>
@@ -7072,6 +7874,7 @@
         <a:font script="Mong" typeface="Mongolian Baiti"/>
         <a:font script="Viet" typeface="Arial"/>
         <a:font script="Uigh" typeface="Microsoft Uighur"/>
+        <a:font script="Geor" typeface="Sylfaen"/>
       </a:minorFont>
     </a:fontScheme>
     <a:fmtScheme name="Office">
@@ -7259,8 +8062,8 @@
         <a:noAutofit/>
       </a:bodyPr>
       <a:lstStyle>
-        <a:defPPr algn="ctr">
-          <a:defRPr sz="2400" dirty="0" smtClean="0">
+        <a:defPPr>
+          <a:defRPr dirty="0">
             <a:solidFill>
               <a:schemeClr val="tx1"/>
             </a:solidFill>
@@ -7282,32 +8085,6 @@
         </a:fontRef>
       </a:style>
     </a:spDef>
-    <a:lnDef>
-      <a:spPr>
-        <a:ln w="12700">
-          <a:solidFill>
-            <a:schemeClr val="tx1"/>
-          </a:solidFill>
-          <a:tailEnd type="stealth" w="lg" len="lg"/>
-        </a:ln>
-      </a:spPr>
-      <a:bodyPr/>
-      <a:lstStyle/>
-      <a:style>
-        <a:lnRef idx="1">
-          <a:schemeClr val="accent1"/>
-        </a:lnRef>
-        <a:fillRef idx="0">
-          <a:schemeClr val="accent1"/>
-        </a:fillRef>
-        <a:effectRef idx="0">
-          <a:schemeClr val="accent1"/>
-        </a:effectRef>
-        <a:fontRef idx="minor">
-          <a:schemeClr val="tx1"/>
-        </a:fontRef>
-      </a:style>
-    </a:lnDef>
   </a:objectDefaults>
   <a:extraClrSchemeLst/>
 </a:theme>

</xml_diff>

<commit_message>
updated coding-conventions.html and added links to it
</commit_message>
<xml_diff>
--- a/Slides/Lesson 8.3 Binary Search.pptx
+++ b/Slides/Lesson 8.3 Binary Search.pptx
@@ -5,7 +5,7 @@
     <p:sldMasterId id="2147483660" r:id="rId1"/>
   </p:sldMasterIdLst>
   <p:notesMasterIdLst>
-    <p:notesMasterId r:id="rId18"/>
+    <p:notesMasterId r:id="rId19"/>
   </p:notesMasterIdLst>
   <p:sldIdLst>
     <p:sldId id="358" r:id="rId2"/>
@@ -22,13 +22,14 @@
     <p:sldId id="369" r:id="rId13"/>
     <p:sldId id="370" r:id="rId14"/>
     <p:sldId id="371" r:id="rId15"/>
-    <p:sldId id="372" r:id="rId16"/>
-    <p:sldId id="373" r:id="rId17"/>
+    <p:sldId id="374" r:id="rId16"/>
+    <p:sldId id="372" r:id="rId17"/>
+    <p:sldId id="373" r:id="rId18"/>
   </p:sldIdLst>
   <p:sldSz cx="9144000" cy="6858000" type="screen4x3"/>
   <p:notesSz cx="6858000" cy="9144000"/>
   <p:custDataLst>
-    <p:tags r:id="rId19"/>
+    <p:tags r:id="rId20"/>
   </p:custDataLst>
   <p:defaultTextStyle>
     <a:defPPr>
@@ -241,7 +242,7 @@
             <a:fld id="{CF8F25F6-E1EF-4065-8525-42EDEBD9BD22}" type="datetimeFigureOut">
               <a:rPr lang="en-US" smtClean="0"/>
               <a:pPr/>
-              <a:t>10/5/2015</a:t>
+              <a:t>10/7/2015</a:t>
             </a:fld>
             <a:endParaRPr lang="en-US"/>
           </a:p>
@@ -780,7 +781,7 @@
           <a:p>
             <a:fld id="{2F1F79F5-7BEC-496A-AFC7-876E38F64D71}" type="datetime1">
               <a:rPr lang="en-US" smtClean="0"/>
-              <a:t>10/5/2015</a:t>
+              <a:t>10/7/2015</a:t>
             </a:fld>
             <a:endParaRPr lang="en-US"/>
           </a:p>
@@ -882,7 +883,7 @@
           <a:p>
             <a:fld id="{0A05703A-7669-4FEA-9056-25299B4D29D4}" type="datetime1">
               <a:rPr lang="en-US" smtClean="0"/>
-              <a:t>10/5/2015</a:t>
+              <a:t>10/7/2015</a:t>
             </a:fld>
             <a:endParaRPr lang="en-US"/>
           </a:p>
@@ -1159,7 +1160,7 @@
           <a:p>
             <a:fld id="{6E5077B5-BB57-49DB-88CA-226A139E5C01}" type="datetime1">
               <a:rPr lang="en-US" smtClean="0"/>
-              <a:t>10/5/2015</a:t>
+              <a:t>10/7/2015</a:t>
             </a:fld>
             <a:endParaRPr lang="en-US"/>
           </a:p>
@@ -1412,7 +1413,7 @@
           <a:p>
             <a:fld id="{C48D9447-CBD6-49A1-89FD-8512A8CF8999}" type="datetime1">
               <a:rPr lang="en-US" smtClean="0"/>
-              <a:t>10/5/2015</a:t>
+              <a:t>10/7/2015</a:t>
             </a:fld>
             <a:endParaRPr lang="en-US"/>
           </a:p>
@@ -1582,7 +1583,7 @@
           <a:p>
             <a:fld id="{A3639A2A-823D-48B7-9ACE-7FAF42870BA9}" type="datetime1">
               <a:rPr lang="en-US" smtClean="0"/>
-              <a:t>10/5/2015</a:t>
+              <a:t>10/7/2015</a:t>
             </a:fld>
             <a:endParaRPr lang="en-US"/>
           </a:p>
@@ -1762,7 +1763,7 @@
           <a:p>
             <a:fld id="{ED1B6996-82E9-463C-972C-7B56056E426C}" type="datetime1">
               <a:rPr lang="en-US" smtClean="0"/>
-              <a:t>10/5/2015</a:t>
+              <a:t>10/7/2015</a:t>
             </a:fld>
             <a:endParaRPr lang="en-US"/>
           </a:p>
@@ -1938,7 +1939,7 @@
           <a:p>
             <a:fld id="{E22ED4DA-448D-4BB1-B935-CC112220207B}" type="datetime1">
               <a:rPr lang="en-US" smtClean="0"/>
-              <a:t>10/5/2015</a:t>
+              <a:t>10/7/2015</a:t>
             </a:fld>
             <a:endParaRPr lang="en-US"/>
           </a:p>
@@ -2120,7 +2121,7 @@
           <a:p>
             <a:fld id="{E22ED4DA-448D-4BB1-B935-CC112220207B}" type="datetime1">
               <a:rPr lang="en-US" smtClean="0"/>
-              <a:t>10/5/2015</a:t>
+              <a:t>10/7/2015</a:t>
             </a:fld>
             <a:endParaRPr lang="en-US"/>
           </a:p>
@@ -2389,7 +2390,7 @@
           <a:p>
             <a:fld id="{FF5D65A6-AB94-4435-B0B7-3743215FA46C}" type="datetime1">
               <a:rPr lang="en-US" smtClean="0"/>
-              <a:t>10/5/2015</a:t>
+              <a:t>10/7/2015</a:t>
             </a:fld>
             <a:endParaRPr lang="en-US"/>
           </a:p>
@@ -2574,7 +2575,7 @@
           <a:p>
             <a:fld id="{FF5D65A6-AB94-4435-B0B7-3743215FA46C}" type="datetime1">
               <a:rPr lang="en-US" smtClean="0"/>
-              <a:t>10/5/2015</a:t>
+              <a:t>10/7/2015</a:t>
             </a:fld>
             <a:endParaRPr lang="en-US"/>
           </a:p>
@@ -2876,7 +2877,7 @@
           <a:p>
             <a:fld id="{7C193DC4-6EF0-48C9-B29C-616106A645E1}" type="datetime1">
               <a:rPr lang="en-US" smtClean="0"/>
-              <a:t>10/5/2015</a:t>
+              <a:t>10/7/2015</a:t>
             </a:fld>
             <a:endParaRPr lang="en-US"/>
           </a:p>
@@ -3164,7 +3165,7 @@
           <a:p>
             <a:fld id="{5D1846AD-9252-4647-9435-4C2AC365653A}" type="datetime1">
               <a:rPr lang="en-US" smtClean="0"/>
-              <a:t>10/5/2015</a:t>
+              <a:t>10/7/2015</a:t>
             </a:fld>
             <a:endParaRPr lang="en-US"/>
           </a:p>
@@ -3586,7 +3587,7 @@
           <a:p>
             <a:fld id="{CE56DC10-3561-4063-A6AF-C1CC7A41040A}" type="datetime1">
               <a:rPr lang="en-US" smtClean="0"/>
-              <a:t>10/5/2015</a:t>
+              <a:t>10/7/2015</a:t>
             </a:fld>
             <a:endParaRPr lang="en-US"/>
           </a:p>
@@ -3704,7 +3705,7 @@
           <a:p>
             <a:fld id="{2F7B77F5-1464-4F6B-92A8-64FC8A508293}" type="datetime1">
               <a:rPr lang="en-US" smtClean="0"/>
-              <a:t>10/5/2015</a:t>
+              <a:t>10/7/2015</a:t>
             </a:fld>
             <a:endParaRPr lang="en-US"/>
           </a:p>
@@ -3936,7 +3937,7 @@
           <a:p>
             <a:fld id="{02B3F677-983B-48DB-ADFD-63FE6CBC7FB2}" type="datetime1">
               <a:rPr lang="en-US" smtClean="0"/>
-              <a:t>10/5/2015</a:t>
+              <a:t>10/7/2015</a:t>
             </a:fld>
             <a:endParaRPr lang="en-US"/>
           </a:p>
@@ -4673,7 +4674,17 @@
           <a:p>
             <a:r>
               <a:rPr lang="en-US" dirty="0" smtClean="0"/>
-              <a:t>Choose a midpoint </a:t>
+              <a:t>At this point we know that lo &lt; hi.</a:t>
+            </a:r>
+          </a:p>
+          <a:p>
+            <a:r>
+              <a:rPr lang="en-US" dirty="0" smtClean="0"/>
+              <a:t>Choose </a:t>
+            </a:r>
+            <a:r>
+              <a:rPr lang="en-US" dirty="0" smtClean="0"/>
+              <a:t>a midpoint </a:t>
             </a:r>
             <a:r>
               <a:rPr lang="en-US" b="1" dirty="0" smtClean="0"/>
@@ -4732,7 +4743,11 @@
             </a:r>
             <a:r>
               <a:rPr lang="en-US" dirty="0" smtClean="0"/>
-              <a:t> to be near the center means that the search space is divided in half every time, so you'll only need about log(</a:t>
+              <a:t> to be near the center means that the search space is divided in half every time, so you'll only need about </a:t>
+            </a:r>
+            <a:r>
+              <a:rPr lang="en-US" dirty="0" smtClean="0"/>
+              <a:t>log₂(</a:t>
             </a:r>
             <a:r>
               <a:rPr lang="en-US" b="1" dirty="0" smtClean="0"/>
@@ -5760,6 +5775,13 @@
   <p:clrMapOvr>
     <a:masterClrMapping/>
   </p:clrMapOvr>
+  <p:timing>
+    <p:tnLst>
+      <p:par>
+        <p:cTn id="1" dur="indefinite" restart="never" nodeType="tmRoot"/>
+      </p:par>
+    </p:tnLst>
+  </p:timing>
 </p:sld>
 </file>
 
@@ -5856,13 +5878,21 @@
             <a:pPr lvl="2"/>
             <a:r>
               <a:rPr lang="en-US" dirty="0" smtClean="0"/>
-              <a:t>At every recursive call, the size of the search region decreases by at least 1 (because p is removed from the search region).</a:t>
-            </a:r>
-          </a:p>
-          <a:p>
+              <a:t>At every recursive call, the size of the search region decreases by at least 1 (because p is removed from the search region</a:t>
+            </a:r>
+            <a:r>
+              <a:rPr lang="en-US" dirty="0" smtClean="0"/>
+              <a:t>).*</a:t>
+            </a:r>
+          </a:p>
+          <a:p>
+            <a:r>
+              <a:rPr lang="en-US" dirty="0" smtClean="0"/>
+              <a:t>So </a:t>
+            </a:r>
             <a:r>
               <a:rPr lang="en-US" dirty="0"/>
-              <a:t>So max(0,hi-lo</a:t>
+              <a:t>max(0,hi-lo</a:t>
             </a:r>
             <a:r>
               <a:rPr lang="en-US" dirty="0" smtClean="0"/>
@@ -5892,6 +5922,67 @@
               <a:t>14</a:t>
             </a:fld>
             <a:endParaRPr lang="en-US"/>
+          </a:p>
+        </p:txBody>
+      </p:sp>
+      <p:sp>
+        <p:nvSpPr>
+          <p:cNvPr id="4" name="Rectangle 3"/>
+          <p:cNvSpPr/>
+          <p:nvPr/>
+        </p:nvSpPr>
+        <p:spPr>
+          <a:xfrm>
+            <a:off x="4648200" y="5562600"/>
+            <a:ext cx="3124200" cy="990600"/>
+          </a:xfrm>
+          <a:prstGeom prst="rect">
+            <a:avLst/>
+          </a:prstGeom>
+          <a:solidFill>
+            <a:schemeClr val="accent3">
+              <a:lumMod val="40000"/>
+              <a:lumOff val="60000"/>
+            </a:schemeClr>
+          </a:solidFill>
+          <a:ln/>
+        </p:spPr>
+        <p:style>
+          <a:lnRef idx="2">
+            <a:schemeClr val="accent1"/>
+          </a:lnRef>
+          <a:fillRef idx="1">
+            <a:schemeClr val="lt1"/>
+          </a:fillRef>
+          <a:effectRef idx="0">
+            <a:schemeClr val="accent1"/>
+          </a:effectRef>
+          <a:fontRef idx="minor">
+            <a:schemeClr val="dk1"/>
+          </a:fontRef>
+        </p:style>
+        <p:txBody>
+          <a:bodyPr rot="0" spcFirstLastPara="0" vertOverflow="overflow" horzOverflow="overflow" vert="horz" wrap="square" lIns="91440" tIns="45720" rIns="91440" bIns="45720" numCol="1" spcCol="0" rtlCol="0" fromWordArt="0" anchor="t" anchorCtr="0" forceAA="0" compatLnSpc="1">
+            <a:prstTxWarp prst="textNoShape">
+              <a:avLst/>
+            </a:prstTxWarp>
+            <a:noAutofit/>
+          </a:bodyPr>
+          <a:lstStyle/>
+          <a:p>
+            <a:r>
+              <a:rPr lang="en-US" dirty="0" smtClean="0">
+                <a:solidFill>
+                  <a:schemeClr val="tx1"/>
+                </a:solidFill>
+              </a:rPr>
+              <a:t>* This is actually subtle– see the next slide for details.</a:t>
+            </a:r>
+            <a:endParaRPr lang="en-US" dirty="0">
+              <a:solidFill>
+                <a:schemeClr val="tx1"/>
+              </a:solidFill>
+            </a:endParaRPr>
           </a:p>
         </p:txBody>
       </p:sp>
@@ -5942,18 +6033,16 @@
             <p:ph type="title"/>
           </p:nvPr>
         </p:nvSpPr>
-        <p:spPr>
-          <a:solidFill>
-            <a:schemeClr val="bg1"/>
-          </a:solidFill>
-        </p:spPr>
-        <p:txBody>
-          <a:bodyPr/>
-          <a:lstStyle/>
-          <a:p>
-            <a:r>
-              <a:rPr lang="en-US" dirty="0" smtClean="0"/>
-              <a:t>Summary</a:t>
+        <p:spPr/>
+        <p:txBody>
+          <a:bodyPr>
+            <a:normAutofit fontScale="90000"/>
+          </a:bodyPr>
+          <a:lstStyle/>
+          <a:p>
+            <a:r>
+              <a:rPr lang="en-US" dirty="0" smtClean="0"/>
+              <a:t>Checking that the halting measure decreases</a:t>
             </a:r>
             <a:endParaRPr lang="en-US" dirty="0"/>
           </a:p>
@@ -5968,85 +6057,283 @@
           <p:nvPr>
             <p:ph idx="1"/>
           </p:nvPr>
+        </p:nvSpPr>
+        <p:spPr/>
+        <p:txBody>
+          <a:bodyPr>
+            <a:normAutofit fontScale="55000" lnSpcReduction="20000"/>
+          </a:bodyPr>
+          <a:lstStyle/>
+          <a:p>
+            <a:r>
+              <a:rPr lang="en-US" dirty="0" smtClean="0"/>
+              <a:t>Let’s try the first case:</a:t>
+            </a:r>
+          </a:p>
+          <a:p>
+            <a:pPr lvl="1"/>
+            <a:r>
+              <a:rPr lang="en-US" dirty="0" smtClean="0"/>
+              <a:t>We have</a:t>
+            </a:r>
+          </a:p>
+          <a:p>
+            <a:pPr lvl="2"/>
+            <a:r>
+              <a:rPr lang="en-US" dirty="0" smtClean="0"/>
+              <a:t>lo &lt; hi               [that’s how we got to the cond clause]</a:t>
+            </a:r>
+          </a:p>
+          <a:p>
+            <a:pPr lvl="2"/>
+            <a:r>
+              <a:rPr lang="en-US" dirty="0" smtClean="0"/>
+              <a:t>lo ≤ p ≤ hi    [that’s how we chose p]</a:t>
+            </a:r>
+          </a:p>
+          <a:p>
+            <a:pPr lvl="2"/>
+            <a:r>
+              <a:rPr lang="en-US" dirty="0"/>
+              <a:t>f(p) &lt; </a:t>
+            </a:r>
+            <a:r>
+              <a:rPr lang="en-US" dirty="0" err="1" smtClean="0"/>
+              <a:t>tgt</a:t>
+            </a:r>
+            <a:r>
+              <a:rPr lang="en-US" dirty="0" smtClean="0"/>
+              <a:t>           [that’s the case we are considering.]</a:t>
+            </a:r>
+          </a:p>
+          <a:p>
+            <a:pPr lvl="1"/>
+            <a:r>
+              <a:rPr lang="en-US" dirty="0" smtClean="0"/>
+              <a:t>So hi-lo &gt; 0, so max(0,hi-lo) = hi-lo.</a:t>
+            </a:r>
+            <a:endParaRPr lang="en-US" dirty="0"/>
+          </a:p>
+          <a:p>
+            <a:pPr lvl="1"/>
+            <a:r>
+              <a:rPr lang="en-US" dirty="0" smtClean="0"/>
+              <a:t>In this case we set lo1 (the new value of lo) to be p+1, and hi1, the new value of hi, to be equal to hi.</a:t>
+            </a:r>
+          </a:p>
+          <a:p>
+            <a:pPr lvl="1"/>
+            <a:r>
+              <a:rPr lang="en-US" dirty="0" smtClean="0"/>
+              <a:t>Now we can calculate:</a:t>
+            </a:r>
+          </a:p>
+          <a:p>
+            <a:pPr marL="914400" lvl="2" indent="0">
+              <a:buNone/>
+            </a:pPr>
+            <a:r>
+              <a:rPr lang="en-US" dirty="0" smtClean="0"/>
+              <a:t>hi1-lo1 </a:t>
+            </a:r>
+          </a:p>
+          <a:p>
+            <a:pPr marL="914400" lvl="2" indent="0">
+              <a:buNone/>
+            </a:pPr>
+            <a:r>
+              <a:rPr lang="en-US" dirty="0" smtClean="0"/>
+              <a:t>= hi-(p+1)      [substituting values of hi1 and  lo1]</a:t>
+            </a:r>
+          </a:p>
+          <a:p>
+            <a:pPr marL="914400" lvl="2" indent="0">
+              <a:buNone/>
+            </a:pPr>
+            <a:r>
+              <a:rPr lang="en-US" dirty="0" smtClean="0"/>
+              <a:t>&lt; hi – p          [since p &lt; p+1]</a:t>
+            </a:r>
+          </a:p>
+          <a:p>
+            <a:pPr marL="914400" lvl="2" indent="0">
+              <a:buNone/>
+            </a:pPr>
+            <a:r>
+              <a:rPr lang="en-US" dirty="0" smtClean="0"/>
+              <a:t>≤ hi – lo       [since lo ≤ p]</a:t>
+            </a:r>
+          </a:p>
+          <a:p>
+            <a:pPr lvl="1"/>
+            <a:r>
+              <a:rPr lang="en-US" dirty="0" smtClean="0"/>
+              <a:t>So (h1-lo1) &lt; (hi-lo).</a:t>
+            </a:r>
+          </a:p>
+          <a:p>
+            <a:pPr lvl="1"/>
+            <a:r>
+              <a:rPr lang="en-US" dirty="0" smtClean="0"/>
+              <a:t>If </a:t>
+            </a:r>
+            <a:r>
+              <a:rPr lang="en-US" smtClean="0"/>
+              <a:t>hi1-lo1 ≥ </a:t>
+            </a:r>
+            <a:r>
+              <a:rPr lang="en-US" dirty="0" smtClean="0"/>
+              <a:t>0, then max(0,hi1-lo1) = hi1-lo1 &lt; </a:t>
+            </a:r>
+            <a:r>
+              <a:rPr lang="en-US" dirty="0"/>
+              <a:t>(hi-lo</a:t>
+            </a:r>
+            <a:r>
+              <a:rPr lang="en-US" dirty="0" smtClean="0"/>
+              <a:t>) = </a:t>
+            </a:r>
+            <a:r>
+              <a:rPr lang="en-US" dirty="0"/>
+              <a:t>max(0,hi-lo) </a:t>
+            </a:r>
+            <a:endParaRPr lang="en-US" dirty="0" smtClean="0"/>
+          </a:p>
+          <a:p>
+            <a:pPr lvl="1"/>
+            <a:r>
+              <a:rPr lang="en-US" dirty="0" smtClean="0"/>
+              <a:t>If hi1-lo1 &lt; 0, then max(0,hi1-lo1) = 0 &lt; hi-lo = max(0, hi-lo)</a:t>
+            </a:r>
+          </a:p>
+          <a:p>
+            <a:pPr lvl="1"/>
+            <a:r>
+              <a:rPr lang="en-US" dirty="0" smtClean="0"/>
+              <a:t>So either way, we have </a:t>
+            </a:r>
+            <a:r>
+              <a:rPr lang="en-US" dirty="0"/>
+              <a:t>max(0,hi1-lo1) </a:t>
+            </a:r>
+            <a:r>
+              <a:rPr lang="en-US" dirty="0" smtClean="0"/>
+              <a:t>&lt; </a:t>
+            </a:r>
+            <a:r>
+              <a:rPr lang="en-US" dirty="0"/>
+              <a:t>max(0, hi-lo</a:t>
+            </a:r>
+            <a:r>
+              <a:rPr lang="en-US" dirty="0" smtClean="0"/>
+              <a:t>), and the halting measure has decreased.</a:t>
+            </a:r>
+          </a:p>
+          <a:p>
+            <a:r>
+              <a:rPr lang="en-US" dirty="0" smtClean="0"/>
+              <a:t>The other case is similar, of course.</a:t>
+            </a:r>
+            <a:endParaRPr lang="en-US" dirty="0"/>
+          </a:p>
+          <a:p>
+            <a:pPr lvl="1"/>
+            <a:endParaRPr lang="en-US" dirty="0" smtClean="0"/>
+          </a:p>
+          <a:p>
+            <a:pPr lvl="1"/>
+            <a:endParaRPr lang="en-US" dirty="0" smtClean="0"/>
+          </a:p>
+        </p:txBody>
+      </p:sp>
+      <p:sp>
+        <p:nvSpPr>
+          <p:cNvPr id="4" name="Slide Number Placeholder 3"/>
+          <p:cNvSpPr>
+            <a:spLocks noGrp="1"/>
+          </p:cNvSpPr>
+          <p:nvPr>
+            <p:ph type="sldNum" sz="quarter" idx="12"/>
+          </p:nvPr>
+        </p:nvSpPr>
+        <p:spPr/>
+        <p:txBody>
+          <a:bodyPr/>
+          <a:lstStyle/>
+          <a:p>
+            <a:fld id="{2AF3B5EA-18B6-4040-9F78-6052AF49C681}" type="slidenum">
+              <a:rPr lang="en-US" smtClean="0"/>
+              <a:t>15</a:t>
+            </a:fld>
+            <a:endParaRPr lang="en-US"/>
+          </a:p>
+        </p:txBody>
+      </p:sp>
+      <p:sp>
+        <p:nvSpPr>
+          <p:cNvPr id="5" name="Rectangle 4"/>
+          <p:cNvSpPr/>
+          <p:nvPr/>
         </p:nvSpPr>
         <p:spPr>
           <a:xfrm>
-            <a:off x="457200" y="1676400"/>
-            <a:ext cx="8229600" cy="4525963"/>
+            <a:off x="4587240" y="5334000"/>
+            <a:ext cx="3352800" cy="1235075"/>
           </a:xfrm>
+          <a:prstGeom prst="rect">
+            <a:avLst/>
+          </a:prstGeom>
+          <a:solidFill>
+            <a:schemeClr val="accent3">
+              <a:lumMod val="40000"/>
+              <a:lumOff val="60000"/>
+            </a:schemeClr>
+          </a:solidFill>
+          <a:ln/>
         </p:spPr>
-        <p:txBody>
-          <a:bodyPr/>
-          <a:lstStyle/>
-          <a:p>
-            <a:r>
-              <a:rPr lang="en-US" dirty="0" smtClean="0"/>
-              <a:t>You should now be able to:</a:t>
-            </a:r>
-          </a:p>
-          <a:p>
-            <a:pPr lvl="1"/>
-            <a:r>
-              <a:rPr lang="en-US" dirty="0"/>
-              <a:t>explain </a:t>
-            </a:r>
-            <a:r>
-              <a:rPr lang="en-US" dirty="0" smtClean="0"/>
-              <a:t>what binary search is and when it is appropriate</a:t>
-            </a:r>
-          </a:p>
-          <a:p>
-            <a:pPr lvl="1"/>
-            <a:r>
-              <a:rPr lang="en-US" dirty="0" smtClean="0"/>
-              <a:t>explain how the standard binary search works, and how it fits into the framework of general recursion</a:t>
-            </a:r>
-          </a:p>
-          <a:p>
-            <a:pPr lvl="1"/>
-            <a:r>
-              <a:rPr lang="en-US" dirty="0" smtClean="0"/>
-              <a:t>give the halting measure and explain the termination argument for binary search</a:t>
-            </a:r>
-          </a:p>
-          <a:p>
-            <a:pPr lvl="1"/>
-            <a:r>
-              <a:rPr lang="en-US" dirty="0" smtClean="0"/>
-              <a:t>write variations on a binary search function</a:t>
-            </a:r>
-            <a:endParaRPr lang="en-US" dirty="0"/>
-          </a:p>
-        </p:txBody>
-      </p:sp>
-      <p:sp>
-        <p:nvSpPr>
-          <p:cNvPr id="4" name="Slide Number Placeholder 3"/>
-          <p:cNvSpPr>
-            <a:spLocks noGrp="1"/>
-          </p:cNvSpPr>
-          <p:nvPr>
-            <p:ph type="sldNum" sz="quarter" idx="12"/>
-          </p:nvPr>
-        </p:nvSpPr>
-        <p:spPr/>
-        <p:txBody>
-          <a:bodyPr/>
-          <a:lstStyle/>
-          <a:p>
-            <a:fld id="{9F4492BD-6A9C-48FC-AC76-0B4FE11194A1}" type="slidenum">
-              <a:rPr lang="en-US" smtClean="0"/>
-              <a:pPr/>
-              <a:t>15</a:t>
-            </a:fld>
-            <a:endParaRPr lang="en-US"/>
+        <p:style>
+          <a:lnRef idx="2">
+            <a:schemeClr val="accent1"/>
+          </a:lnRef>
+          <a:fillRef idx="1">
+            <a:schemeClr val="lt1"/>
+          </a:fillRef>
+          <a:effectRef idx="0">
+            <a:schemeClr val="accent1"/>
+          </a:effectRef>
+          <a:fontRef idx="minor">
+            <a:schemeClr val="dk1"/>
+          </a:fontRef>
+        </p:style>
+        <p:txBody>
+          <a:bodyPr rot="0" spcFirstLastPara="0" vertOverflow="overflow" horzOverflow="overflow" vert="horz" wrap="square" lIns="91440" tIns="45720" rIns="91440" bIns="45720" numCol="1" spcCol="0" rtlCol="0" fromWordArt="0" anchor="ctr" anchorCtr="0" forceAA="0" compatLnSpc="1">
+            <a:prstTxWarp prst="textNoShape">
+              <a:avLst/>
+            </a:prstTxWarp>
+            <a:noAutofit/>
+          </a:bodyPr>
+          <a:lstStyle/>
+          <a:p>
+            <a:r>
+              <a:rPr lang="en-US" sz="1400" dirty="0" smtClean="0">
+                <a:solidFill>
+                  <a:schemeClr val="tx1"/>
+                </a:solidFill>
+              </a:rPr>
+              <a:t>Yes, making this argument bullet-proof is tricky.  But this merely reflects the fact it’s easy to write sloppy binary search code that will sometimes fail to terminate. So either way you have to be careful.</a:t>
+            </a:r>
+            <a:endParaRPr lang="en-US" sz="1400" dirty="0">
+              <a:solidFill>
+                <a:schemeClr val="tx1"/>
+              </a:solidFill>
+            </a:endParaRPr>
           </a:p>
         </p:txBody>
       </p:sp>
     </p:spTree>
     <p:extLst>
       <p:ext uri="{BB962C8B-B14F-4D97-AF65-F5344CB8AC3E}">
-        <p14:creationId xmlns:p14="http://schemas.microsoft.com/office/powerpoint/2010/main" val="1174789038"/>
+        <p14:creationId xmlns:p14="http://schemas.microsoft.com/office/powerpoint/2010/main" val="3087112873"/>
       </p:ext>
     </p:extLst>
   </p:cSld>
@@ -6090,14 +6377,18 @@
             <p:ph type="title"/>
           </p:nvPr>
         </p:nvSpPr>
-        <p:spPr/>
-        <p:txBody>
-          <a:bodyPr/>
-          <a:lstStyle/>
-          <a:p>
-            <a:r>
-              <a:rPr lang="en-US" dirty="0" smtClean="0"/>
-              <a:t>Next Steps</a:t>
+        <p:spPr>
+          <a:solidFill>
+            <a:schemeClr val="bg1"/>
+          </a:solidFill>
+        </p:spPr>
+        <p:txBody>
+          <a:bodyPr/>
+          <a:lstStyle/>
+          <a:p>
+            <a:r>
+              <a:rPr lang="en-US" dirty="0" smtClean="0"/>
+              <a:t>Summary</a:t>
             </a:r>
             <a:endParaRPr lang="en-US" dirty="0"/>
           </a:p>
@@ -6113,32 +6404,51 @@
             <p:ph idx="1"/>
           </p:nvPr>
         </p:nvSpPr>
-        <p:spPr/>
-        <p:txBody>
-          <a:bodyPr/>
-          <a:lstStyle/>
-          <a:p>
-            <a:r>
-              <a:rPr lang="en-US" dirty="0" smtClean="0"/>
-              <a:t>Study the file 08-6-binary-search.rkt in the Examples folder</a:t>
-            </a:r>
-          </a:p>
-          <a:p>
-            <a:r>
-              <a:rPr lang="en-US" dirty="0" smtClean="0"/>
-              <a:t>If you have questions about this lesson, ask them on the Discussion Board</a:t>
-            </a:r>
-          </a:p>
-          <a:p>
-            <a:r>
-              <a:rPr lang="en-US" dirty="0" smtClean="0"/>
-              <a:t>Do Guided Practice 8.3</a:t>
-            </a:r>
-          </a:p>
-          <a:p>
-            <a:r>
-              <a:rPr lang="en-US" dirty="0" smtClean="0"/>
-              <a:t>Go on to the next lesson</a:t>
+        <p:spPr>
+          <a:xfrm>
+            <a:off x="457200" y="1676400"/>
+            <a:ext cx="8229600" cy="4525963"/>
+          </a:xfrm>
+        </p:spPr>
+        <p:txBody>
+          <a:bodyPr/>
+          <a:lstStyle/>
+          <a:p>
+            <a:r>
+              <a:rPr lang="en-US" dirty="0" smtClean="0"/>
+              <a:t>You should now be able to:</a:t>
+            </a:r>
+          </a:p>
+          <a:p>
+            <a:pPr lvl="1"/>
+            <a:r>
+              <a:rPr lang="en-US" dirty="0"/>
+              <a:t>explain </a:t>
+            </a:r>
+            <a:r>
+              <a:rPr lang="en-US" dirty="0" smtClean="0"/>
+              <a:t>what binary search is and when it is appropriate</a:t>
+            </a:r>
+          </a:p>
+          <a:p>
+            <a:pPr lvl="1"/>
+            <a:r>
+              <a:rPr lang="en-US" dirty="0" smtClean="0"/>
+              <a:t>explain how the standard binary search works, and how it fits into the framework of general recursion</a:t>
+            </a:r>
+          </a:p>
+          <a:p>
+            <a:pPr lvl="1"/>
+            <a:r>
+              <a:rPr lang="en-US" dirty="0" smtClean="0"/>
+              <a:t>give the halting measure and explain the termination argument for binary search</a:t>
+            </a:r>
+          </a:p>
+          <a:p>
+            <a:pPr lvl="1"/>
+            <a:r>
+              <a:rPr lang="en-US" dirty="0" smtClean="0"/>
+              <a:t>write variations on a binary search function</a:t>
             </a:r>
             <a:endParaRPr lang="en-US" dirty="0"/>
           </a:p>
@@ -6163,6 +6473,131 @@
               <a:rPr lang="en-US" smtClean="0"/>
               <a:pPr/>
               <a:t>16</a:t>
+            </a:fld>
+            <a:endParaRPr lang="en-US"/>
+          </a:p>
+        </p:txBody>
+      </p:sp>
+    </p:spTree>
+    <p:extLst>
+      <p:ext uri="{BB962C8B-B14F-4D97-AF65-F5344CB8AC3E}">
+        <p14:creationId xmlns:p14="http://schemas.microsoft.com/office/powerpoint/2010/main" val="1174789038"/>
+      </p:ext>
+    </p:extLst>
+  </p:cSld>
+  <p:clrMapOvr>
+    <a:masterClrMapping/>
+  </p:clrMapOvr>
+  <p:timing>
+    <p:tnLst>
+      <p:par>
+        <p:cTn id="1" dur="indefinite" restart="never" nodeType="tmRoot"/>
+      </p:par>
+    </p:tnLst>
+  </p:timing>
+</p:sld>
+</file>
+
+<file path=ppt/slides/slide17.xml><?xml version="1.0" encoding="utf-8"?>
+<p:sld xmlns:a="http://schemas.openxmlformats.org/drawingml/2006/main" xmlns:r="http://schemas.openxmlformats.org/officeDocument/2006/relationships" xmlns:p="http://schemas.openxmlformats.org/presentationml/2006/main">
+  <p:cSld>
+    <p:spTree>
+      <p:nvGrpSpPr>
+        <p:cNvPr id="1" name=""/>
+        <p:cNvGrpSpPr/>
+        <p:nvPr/>
+      </p:nvGrpSpPr>
+      <p:grpSpPr>
+        <a:xfrm>
+          <a:off x="0" y="0"/>
+          <a:ext cx="0" cy="0"/>
+          <a:chOff x="0" y="0"/>
+          <a:chExt cx="0" cy="0"/>
+        </a:xfrm>
+      </p:grpSpPr>
+      <p:sp>
+        <p:nvSpPr>
+          <p:cNvPr id="2" name="Title 1"/>
+          <p:cNvSpPr>
+            <a:spLocks noGrp="1"/>
+          </p:cNvSpPr>
+          <p:nvPr>
+            <p:ph type="title"/>
+          </p:nvPr>
+        </p:nvSpPr>
+        <p:spPr/>
+        <p:txBody>
+          <a:bodyPr/>
+          <a:lstStyle/>
+          <a:p>
+            <a:r>
+              <a:rPr lang="en-US" dirty="0" smtClean="0"/>
+              <a:t>Next Steps</a:t>
+            </a:r>
+            <a:endParaRPr lang="en-US" dirty="0"/>
+          </a:p>
+        </p:txBody>
+      </p:sp>
+      <p:sp>
+        <p:nvSpPr>
+          <p:cNvPr id="3" name="Content Placeholder 2"/>
+          <p:cNvSpPr>
+            <a:spLocks noGrp="1"/>
+          </p:cNvSpPr>
+          <p:nvPr>
+            <p:ph idx="1"/>
+          </p:nvPr>
+        </p:nvSpPr>
+        <p:spPr/>
+        <p:txBody>
+          <a:bodyPr/>
+          <a:lstStyle/>
+          <a:p>
+            <a:r>
+              <a:rPr lang="en-US" dirty="0" smtClean="0"/>
+              <a:t>Study the file 08-6-binary-search.rkt in the Examples folder</a:t>
+            </a:r>
+          </a:p>
+          <a:p>
+            <a:r>
+              <a:rPr lang="en-US" dirty="0" smtClean="0"/>
+              <a:t>If you have questions about this lesson, ask them on the Discussion Board</a:t>
+            </a:r>
+          </a:p>
+          <a:p>
+            <a:r>
+              <a:rPr lang="en-US" dirty="0" smtClean="0"/>
+              <a:t>Do Guided Practice 8.3</a:t>
+            </a:r>
+          </a:p>
+          <a:p>
+            <a:r>
+              <a:rPr lang="en-US" dirty="0" smtClean="0"/>
+              <a:t>Go on to the next lesson</a:t>
+            </a:r>
+            <a:endParaRPr lang="en-US" dirty="0"/>
+          </a:p>
+        </p:txBody>
+      </p:sp>
+      <p:sp>
+        <p:nvSpPr>
+          <p:cNvPr id="4" name="Slide Number Placeholder 3"/>
+          <p:cNvSpPr>
+            <a:spLocks noGrp="1"/>
+          </p:cNvSpPr>
+          <p:nvPr>
+            <p:ph type="sldNum" sz="quarter" idx="12"/>
+          </p:nvPr>
+        </p:nvSpPr>
+        <p:spPr/>
+        <p:txBody>
+          <a:bodyPr/>
+          <a:lstStyle/>
+          <a:p>
+            <a:fld id="{9F4492BD-6A9C-48FC-AC76-0B4FE11194A1}" type="slidenum">
+              <a:rPr lang="en-US" smtClean="0"/>
+              <a:pPr/>
+              <a:t>17</a:t>
             </a:fld>
             <a:endParaRPr lang="en-US"/>
           </a:p>
@@ -7073,7 +7508,7 @@
             </a:pPr>
             <a:r>
               <a:rPr lang="en-US" sz="2400" dirty="0" smtClean="0"/>
-              <a:t>;;   (</a:t>
+              <a:t>;;         (</a:t>
             </a:r>
             <a:r>
               <a:rPr lang="en-US" sz="2400" dirty="0" err="1"/>
@@ -7101,11 +7536,7 @@
             </a:r>
             <a:r>
               <a:rPr lang="en-US" sz="2400" dirty="0" smtClean="0"/>
-              <a:t>)≤f(j</a:t>
-            </a:r>
-            <a:r>
-              <a:rPr lang="en-US" sz="2400" dirty="0"/>
-              <a:t>))</a:t>
+              <a:t>)≤f(j))</a:t>
             </a:r>
           </a:p>
           <a:p>
@@ -7115,8 +7546,12 @@
               </a:spcBef>
             </a:pPr>
             <a:r>
+              <a:rPr lang="en-US" sz="2400" smtClean="0"/>
+              <a:t>;; </a:t>
+            </a:r>
+            <a:r>
               <a:rPr lang="en-US" sz="2400" dirty="0"/>
-              <a:t>;; RETURNS: a number k such that lo ≤ k ≤ hi </a:t>
+              <a:t>RETURNS: a number k such that lo ≤ k ≤ hi </a:t>
             </a:r>
             <a:endParaRPr lang="en-US" sz="2400" dirty="0" smtClean="0"/>
           </a:p>

</xml_diff>

<commit_message>
corrected week07examples, released ps06
</commit_message>
<xml_diff>
--- a/Slides/Lesson 8.3 Binary Search.pptx
+++ b/Slides/Lesson 8.3 Binary Search.pptx
@@ -242,7 +242,7 @@
             <a:fld id="{CF8F25F6-E1EF-4065-8525-42EDEBD9BD22}" type="datetimeFigureOut">
               <a:rPr lang="en-US" smtClean="0"/>
               <a:pPr/>
-              <a:t>10/7/2015</a:t>
+              <a:t>10/16/2015</a:t>
             </a:fld>
             <a:endParaRPr lang="en-US"/>
           </a:p>
@@ -781,7 +781,7 @@
           <a:p>
             <a:fld id="{2F1F79F5-7BEC-496A-AFC7-876E38F64D71}" type="datetime1">
               <a:rPr lang="en-US" smtClean="0"/>
-              <a:t>10/7/2015</a:t>
+              <a:t>10/16/2015</a:t>
             </a:fld>
             <a:endParaRPr lang="en-US"/>
           </a:p>
@@ -883,7 +883,7 @@
           <a:p>
             <a:fld id="{0A05703A-7669-4FEA-9056-25299B4D29D4}" type="datetime1">
               <a:rPr lang="en-US" smtClean="0"/>
-              <a:t>10/7/2015</a:t>
+              <a:t>10/16/2015</a:t>
             </a:fld>
             <a:endParaRPr lang="en-US"/>
           </a:p>
@@ -1160,7 +1160,7 @@
           <a:p>
             <a:fld id="{6E5077B5-BB57-49DB-88CA-226A139E5C01}" type="datetime1">
               <a:rPr lang="en-US" smtClean="0"/>
-              <a:t>10/7/2015</a:t>
+              <a:t>10/16/2015</a:t>
             </a:fld>
             <a:endParaRPr lang="en-US"/>
           </a:p>
@@ -1413,7 +1413,7 @@
           <a:p>
             <a:fld id="{C48D9447-CBD6-49A1-89FD-8512A8CF8999}" type="datetime1">
               <a:rPr lang="en-US" smtClean="0"/>
-              <a:t>10/7/2015</a:t>
+              <a:t>10/16/2015</a:t>
             </a:fld>
             <a:endParaRPr lang="en-US"/>
           </a:p>
@@ -1583,7 +1583,7 @@
           <a:p>
             <a:fld id="{A3639A2A-823D-48B7-9ACE-7FAF42870BA9}" type="datetime1">
               <a:rPr lang="en-US" smtClean="0"/>
-              <a:t>10/7/2015</a:t>
+              <a:t>10/16/2015</a:t>
             </a:fld>
             <a:endParaRPr lang="en-US"/>
           </a:p>
@@ -1763,7 +1763,7 @@
           <a:p>
             <a:fld id="{ED1B6996-82E9-463C-972C-7B56056E426C}" type="datetime1">
               <a:rPr lang="en-US" smtClean="0"/>
-              <a:t>10/7/2015</a:t>
+              <a:t>10/16/2015</a:t>
             </a:fld>
             <a:endParaRPr lang="en-US"/>
           </a:p>
@@ -1939,7 +1939,7 @@
           <a:p>
             <a:fld id="{E22ED4DA-448D-4BB1-B935-CC112220207B}" type="datetime1">
               <a:rPr lang="en-US" smtClean="0"/>
-              <a:t>10/7/2015</a:t>
+              <a:t>10/16/2015</a:t>
             </a:fld>
             <a:endParaRPr lang="en-US"/>
           </a:p>
@@ -2121,7 +2121,7 @@
           <a:p>
             <a:fld id="{E22ED4DA-448D-4BB1-B935-CC112220207B}" type="datetime1">
               <a:rPr lang="en-US" smtClean="0"/>
-              <a:t>10/7/2015</a:t>
+              <a:t>10/16/2015</a:t>
             </a:fld>
             <a:endParaRPr lang="en-US"/>
           </a:p>
@@ -2390,7 +2390,7 @@
           <a:p>
             <a:fld id="{FF5D65A6-AB94-4435-B0B7-3743215FA46C}" type="datetime1">
               <a:rPr lang="en-US" smtClean="0"/>
-              <a:t>10/7/2015</a:t>
+              <a:t>10/16/2015</a:t>
             </a:fld>
             <a:endParaRPr lang="en-US"/>
           </a:p>
@@ -2575,7 +2575,7 @@
           <a:p>
             <a:fld id="{FF5D65A6-AB94-4435-B0B7-3743215FA46C}" type="datetime1">
               <a:rPr lang="en-US" smtClean="0"/>
-              <a:t>10/7/2015</a:t>
+              <a:t>10/16/2015</a:t>
             </a:fld>
             <a:endParaRPr lang="en-US"/>
           </a:p>
@@ -2877,7 +2877,7 @@
           <a:p>
             <a:fld id="{7C193DC4-6EF0-48C9-B29C-616106A645E1}" type="datetime1">
               <a:rPr lang="en-US" smtClean="0"/>
-              <a:t>10/7/2015</a:t>
+              <a:t>10/16/2015</a:t>
             </a:fld>
             <a:endParaRPr lang="en-US"/>
           </a:p>
@@ -3165,7 +3165,7 @@
           <a:p>
             <a:fld id="{5D1846AD-9252-4647-9435-4C2AC365653A}" type="datetime1">
               <a:rPr lang="en-US" smtClean="0"/>
-              <a:t>10/7/2015</a:t>
+              <a:t>10/16/2015</a:t>
             </a:fld>
             <a:endParaRPr lang="en-US"/>
           </a:p>
@@ -3587,7 +3587,7 @@
           <a:p>
             <a:fld id="{CE56DC10-3561-4063-A6AF-C1CC7A41040A}" type="datetime1">
               <a:rPr lang="en-US" smtClean="0"/>
-              <a:t>10/7/2015</a:t>
+              <a:t>10/16/2015</a:t>
             </a:fld>
             <a:endParaRPr lang="en-US"/>
           </a:p>
@@ -3705,7 +3705,7 @@
           <a:p>
             <a:fld id="{2F7B77F5-1464-4F6B-92A8-64FC8A508293}" type="datetime1">
               <a:rPr lang="en-US" smtClean="0"/>
-              <a:t>10/7/2015</a:t>
+              <a:t>10/16/2015</a:t>
             </a:fld>
             <a:endParaRPr lang="en-US"/>
           </a:p>
@@ -3937,7 +3937,7 @@
           <a:p>
             <a:fld id="{02B3F677-983B-48DB-ADFD-63FE6CBC7FB2}" type="datetime1">
               <a:rPr lang="en-US" smtClean="0"/>
-              <a:t>10/7/2015</a:t>
+              <a:t>10/16/2015</a:t>
             </a:fld>
             <a:endParaRPr lang="en-US"/>
           </a:p>
@@ -5058,278 +5058,352 @@
         <p:spPr/>
         <p:txBody>
           <a:bodyPr>
-            <a:normAutofit fontScale="40000" lnSpcReduction="20000"/>
+            <a:normAutofit fontScale="25000" lnSpcReduction="20000"/>
           </a:bodyPr>
           <a:lstStyle/>
           <a:p>
             <a:r>
-              <a:rPr lang="en-US" dirty="0"/>
-              <a:t>(define (binary-search-loop lo hi f </a:t>
-            </a:r>
-            <a:r>
-              <a:rPr lang="en-US" dirty="0" err="1"/>
+              <a:rPr lang="en-US" sz="6400" dirty="0" smtClean="0"/>
+              <a:t>;; </a:t>
+            </a:r>
+            <a:r>
+              <a:rPr lang="en-US" sz="6400" dirty="0"/>
+              <a:t>STRATEGY: recur on either left or right half of [</a:t>
+            </a:r>
+            <a:r>
+              <a:rPr lang="en-US" sz="6400" dirty="0" err="1"/>
+              <a:t>lo,hi</a:t>
+            </a:r>
+            <a:r>
+              <a:rPr lang="en-US" sz="6400" dirty="0" smtClean="0"/>
+              <a:t>].</a:t>
+            </a:r>
+          </a:p>
+          <a:p>
+            <a:endParaRPr lang="en-US" sz="6400" dirty="0"/>
+          </a:p>
+          <a:p>
+            <a:r>
+              <a:rPr lang="en-US" sz="6400" dirty="0" smtClean="0"/>
+              <a:t>(</a:t>
+            </a:r>
+            <a:r>
+              <a:rPr lang="en-US" sz="6400" dirty="0"/>
+              <a:t>define (binary-search-loop lo hi f </a:t>
+            </a:r>
+            <a:r>
+              <a:rPr lang="en-US" sz="6400" dirty="0" err="1"/>
               <a:t>tgt</a:t>
             </a:r>
             <a:r>
-              <a:rPr lang="en-US" dirty="0"/>
+              <a:rPr lang="en-US" sz="6400" dirty="0"/>
               <a:t>)</a:t>
             </a:r>
           </a:p>
           <a:p>
             <a:r>
-              <a:rPr lang="en-US" dirty="0"/>
+              <a:rPr lang="en-US" sz="6400" dirty="0"/>
               <a:t>  (</a:t>
             </a:r>
             <a:r>
-              <a:rPr lang="en-US" dirty="0" err="1"/>
+              <a:rPr lang="en-US" sz="6400" dirty="0" err="1"/>
               <a:t>cond</a:t>
             </a:r>
-            <a:endParaRPr lang="en-US" dirty="0"/>
-          </a:p>
-          <a:p>
-            <a:r>
-              <a:rPr lang="en-US" dirty="0"/>
+            <a:endParaRPr lang="en-US" sz="6400" dirty="0"/>
+          </a:p>
+          <a:p>
+            <a:r>
+              <a:rPr lang="en-US" sz="6400" dirty="0"/>
               <a:t>    [(&gt; lo hi) </a:t>
             </a:r>
-          </a:p>
-          <a:p>
-            <a:r>
-              <a:rPr lang="en-US" dirty="0"/>
-              <a:t>     ;; the search range is empty, return false</a:t>
-            </a:r>
-          </a:p>
-          <a:p>
-            <a:r>
-              <a:rPr lang="en-US" dirty="0"/>
-              <a:t>     false]    </a:t>
-            </a:r>
-          </a:p>
-          <a:p>
-            <a:r>
-              <a:rPr lang="en-US" dirty="0"/>
+            <a:r>
+              <a:rPr lang="en-US" sz="6400" dirty="0" smtClean="0"/>
+              <a:t>      </a:t>
+            </a:r>
+            <a:r>
+              <a:rPr lang="en-US" sz="6400" dirty="0" smtClean="0"/>
+              <a:t>; </a:t>
+            </a:r>
+            <a:r>
+              <a:rPr lang="en-US" sz="6400" dirty="0"/>
+              <a:t>the search range is empty, return false</a:t>
+            </a:r>
+          </a:p>
+          <a:p>
+            <a:r>
+              <a:rPr lang="en-US" sz="6400" dirty="0" smtClean="0"/>
+              <a:t>     false</a:t>
+            </a:r>
+            <a:r>
+              <a:rPr lang="en-US" sz="6400" dirty="0"/>
+              <a:t>]    </a:t>
+            </a:r>
+          </a:p>
+          <a:p>
+            <a:r>
+              <a:rPr lang="en-US" sz="6400" dirty="0"/>
               <a:t>    [(= lo hi) </a:t>
             </a:r>
-          </a:p>
-          <a:p>
-            <a:r>
-              <a:rPr lang="en-US" dirty="0"/>
-              <a:t>     ;; the search range has size 1</a:t>
-            </a:r>
-          </a:p>
-          <a:p>
-            <a:r>
-              <a:rPr lang="en-US" dirty="0"/>
-              <a:t>     (if </a:t>
-            </a:r>
-            <a:r>
-              <a:rPr lang="en-US" dirty="0" smtClean="0"/>
+            <a:r>
+              <a:rPr lang="en-US" sz="6400" dirty="0" smtClean="0"/>
+              <a:t>      </a:t>
+            </a:r>
+            <a:r>
+              <a:rPr lang="en-US" sz="6400" dirty="0" smtClean="0"/>
+              <a:t>; </a:t>
+            </a:r>
+            <a:r>
+              <a:rPr lang="en-US" sz="6400" dirty="0"/>
+              <a:t>the search range has size 1</a:t>
+            </a:r>
+            <a:endParaRPr lang="en-US" sz="6400" dirty="0"/>
+          </a:p>
+          <a:p>
+            <a:r>
+              <a:rPr lang="en-US" sz="6400" dirty="0" smtClean="0"/>
+              <a:t>     </a:t>
+            </a:r>
+            <a:r>
+              <a:rPr lang="en-US" sz="6400" dirty="0"/>
+              <a:t>(if </a:t>
+            </a:r>
+            <a:r>
+              <a:rPr lang="en-US" sz="6400" dirty="0" smtClean="0"/>
               <a:t>(</a:t>
             </a:r>
             <a:r>
-              <a:rPr lang="en-US" dirty="0"/>
+              <a:rPr lang="en-US" sz="6400" dirty="0"/>
               <a:t>=</a:t>
             </a:r>
             <a:r>
-              <a:rPr lang="en-US" dirty="0" smtClean="0"/>
+              <a:rPr lang="en-US" sz="6400" dirty="0" smtClean="0"/>
               <a:t> </a:t>
             </a:r>
             <a:r>
-              <a:rPr lang="en-US" dirty="0"/>
+              <a:rPr lang="en-US" sz="6400" dirty="0"/>
               <a:t>(f lo) </a:t>
             </a:r>
             <a:r>
-              <a:rPr lang="en-US" dirty="0" err="1"/>
+              <a:rPr lang="en-US" sz="6400" dirty="0" err="1"/>
               <a:t>tgt</a:t>
             </a:r>
             <a:r>
-              <a:rPr lang="en-US" dirty="0"/>
+              <a:rPr lang="en-US" sz="6400" dirty="0"/>
               <a:t>) lo false)] </a:t>
             </a:r>
           </a:p>
           <a:p>
             <a:r>
-              <a:rPr lang="en-US" dirty="0"/>
+              <a:rPr lang="en-US" sz="6400" dirty="0"/>
               <a:t>    [else (local</a:t>
             </a:r>
           </a:p>
           <a:p>
             <a:r>
-              <a:rPr lang="en-US" dirty="0"/>
+              <a:rPr lang="en-US" sz="6400" dirty="0"/>
               <a:t>            ((define </a:t>
             </a:r>
             <a:r>
-              <a:rPr lang="en-US" dirty="0" smtClean="0"/>
+              <a:rPr lang="en-US" sz="6400" dirty="0" smtClean="0"/>
               <a:t>p </a:t>
             </a:r>
             <a:r>
-              <a:rPr lang="en-US" dirty="0"/>
+              <a:rPr lang="en-US" sz="6400" dirty="0"/>
               <a:t>(floor (/ (+ lo hi) 2)))</a:t>
             </a:r>
           </a:p>
           <a:p>
             <a:r>
-              <a:rPr lang="en-US" dirty="0"/>
+              <a:rPr lang="en-US" sz="6400" dirty="0"/>
               <a:t>             (define </a:t>
             </a:r>
             <a:r>
-              <a:rPr lang="en-US" dirty="0" smtClean="0"/>
+              <a:rPr lang="en-US" sz="6400" dirty="0" smtClean="0"/>
               <a:t>f-of-midpoint </a:t>
             </a:r>
             <a:r>
-              <a:rPr lang="en-US" dirty="0"/>
+              <a:rPr lang="en-US" sz="6400" dirty="0"/>
               <a:t>(f </a:t>
             </a:r>
             <a:r>
-              <a:rPr lang="en-US" dirty="0" smtClean="0"/>
+              <a:rPr lang="en-US" sz="6400" dirty="0" smtClean="0"/>
               <a:t>p)))</a:t>
             </a:r>
-            <a:endParaRPr lang="en-US" dirty="0"/>
-          </a:p>
-          <a:p>
-            <a:r>
-              <a:rPr lang="en-US" dirty="0"/>
+            <a:endParaRPr lang="en-US" sz="6400" dirty="0"/>
+          </a:p>
+          <a:p>
+            <a:r>
+              <a:rPr lang="en-US" sz="6400" dirty="0"/>
               <a:t>            (</a:t>
             </a:r>
             <a:r>
-              <a:rPr lang="en-US" dirty="0" err="1"/>
+              <a:rPr lang="en-US" sz="6400" dirty="0" err="1"/>
               <a:t>cond</a:t>
             </a:r>
-            <a:endParaRPr lang="en-US" dirty="0"/>
-          </a:p>
-          <a:p>
-            <a:r>
-              <a:rPr lang="en-US" dirty="0"/>
+            <a:endParaRPr lang="en-US" sz="6400" dirty="0"/>
+          </a:p>
+          <a:p>
+            <a:r>
+              <a:rPr lang="en-US" sz="6400" dirty="0"/>
               <a:t>              [(&lt; </a:t>
             </a:r>
             <a:r>
-              <a:rPr lang="en-US" dirty="0" smtClean="0"/>
+              <a:rPr lang="en-US" sz="6400" dirty="0" smtClean="0"/>
               <a:t>f-of-midpoint </a:t>
             </a:r>
             <a:r>
-              <a:rPr lang="en-US" dirty="0" err="1"/>
+              <a:rPr lang="en-US" sz="6400" dirty="0" err="1"/>
               <a:t>tgt</a:t>
             </a:r>
             <a:r>
-              <a:rPr lang="en-US" dirty="0"/>
-              <a:t>)</a:t>
-            </a:r>
-          </a:p>
-          <a:p>
-            <a:r>
-              <a:rPr lang="en-US" dirty="0"/>
-              <a:t>               ;; the </a:t>
-            </a:r>
-            <a:r>
-              <a:rPr lang="en-US" dirty="0" err="1"/>
+              <a:rPr lang="en-US" sz="6400" dirty="0"/>
+              <a:t>) </a:t>
+            </a:r>
+            <a:r>
+              <a:rPr lang="en-US" sz="6400" dirty="0" smtClean="0"/>
+              <a:t>   ; </a:t>
+            </a:r>
+            <a:r>
+              <a:rPr lang="en-US" sz="6400" dirty="0"/>
+              <a:t>the </a:t>
+            </a:r>
+            <a:r>
+              <a:rPr lang="en-US" sz="6400" dirty="0" err="1"/>
               <a:t>tgt</a:t>
             </a:r>
             <a:r>
-              <a:rPr lang="en-US" dirty="0"/>
-              <a:t> is in the right half</a:t>
-            </a:r>
-          </a:p>
-          <a:p>
-            <a:r>
-              <a:rPr lang="en-US" dirty="0"/>
-              <a:t>               (binary-search-loop (+ </a:t>
-            </a:r>
-            <a:r>
-              <a:rPr lang="en-US" dirty="0" smtClean="0"/>
+              <a:rPr lang="en-US" sz="6400" dirty="0"/>
+              <a:t> is in the right </a:t>
+            </a:r>
+            <a:r>
+              <a:rPr lang="en-US" sz="6400" dirty="0" smtClean="0"/>
+              <a:t>half</a:t>
+            </a:r>
+            <a:endParaRPr lang="en-US" sz="6400" dirty="0"/>
+          </a:p>
+          <a:p>
+            <a:r>
+              <a:rPr lang="en-US" sz="6400" dirty="0"/>
+              <a:t>               </a:t>
+            </a:r>
+            <a:r>
+              <a:rPr lang="en-US" sz="6400" dirty="0" smtClean="0"/>
+              <a:t>(</a:t>
+            </a:r>
+            <a:r>
+              <a:rPr lang="en-US" sz="6400" dirty="0"/>
+              <a:t>binary-search-loop (+ </a:t>
+            </a:r>
+            <a:r>
+              <a:rPr lang="en-US" sz="6400" dirty="0" smtClean="0"/>
               <a:t>p </a:t>
             </a:r>
             <a:r>
-              <a:rPr lang="en-US" dirty="0"/>
+              <a:rPr lang="en-US" sz="6400" dirty="0"/>
               <a:t>1) hi f </a:t>
             </a:r>
             <a:r>
-              <a:rPr lang="en-US" dirty="0" err="1"/>
+              <a:rPr lang="en-US" sz="6400" dirty="0" err="1"/>
               <a:t>tgt</a:t>
             </a:r>
             <a:r>
-              <a:rPr lang="en-US" dirty="0"/>
+              <a:rPr lang="en-US" sz="6400" dirty="0"/>
               <a:t>)]</a:t>
             </a:r>
           </a:p>
           <a:p>
             <a:r>
-              <a:rPr lang="en-US" dirty="0"/>
+              <a:rPr lang="en-US" sz="6400" dirty="0"/>
               <a:t>              [(&gt; f-of-midpoint </a:t>
             </a:r>
             <a:r>
-              <a:rPr lang="en-US" dirty="0" err="1"/>
+              <a:rPr lang="en-US" sz="6400" dirty="0" err="1"/>
               <a:t>tgt</a:t>
             </a:r>
             <a:r>
-              <a:rPr lang="en-US" dirty="0"/>
-              <a:t>)</a:t>
-            </a:r>
-          </a:p>
-          <a:p>
-            <a:r>
-              <a:rPr lang="en-US" dirty="0"/>
-              <a:t>               ;; the </a:t>
-            </a:r>
-            <a:r>
-              <a:rPr lang="en-US" dirty="0" err="1"/>
+              <a:rPr lang="en-US" sz="6400" dirty="0"/>
+              <a:t>) </a:t>
+            </a:r>
+            <a:r>
+              <a:rPr lang="en-US" sz="6400" dirty="0" smtClean="0"/>
+              <a:t>   ; </a:t>
+            </a:r>
+            <a:r>
+              <a:rPr lang="en-US" sz="6400" dirty="0"/>
+              <a:t>the </a:t>
+            </a:r>
+            <a:r>
+              <a:rPr lang="en-US" sz="6400" dirty="0" err="1"/>
               <a:t>tgt</a:t>
             </a:r>
             <a:r>
-              <a:rPr lang="en-US" dirty="0"/>
-              <a:t> is in the left half</a:t>
-            </a:r>
-          </a:p>
-          <a:p>
-            <a:r>
-              <a:rPr lang="en-US" dirty="0"/>
+              <a:rPr lang="en-US" sz="6400" dirty="0"/>
+              <a:t> is in the left </a:t>
+            </a:r>
+            <a:r>
+              <a:rPr lang="en-US" sz="6400" dirty="0" smtClean="0"/>
+              <a:t>half</a:t>
+            </a:r>
+            <a:r>
+              <a:rPr lang="en-US" sz="6400" dirty="0" smtClean="0"/>
+              <a:t>               </a:t>
+            </a:r>
+            <a:endParaRPr lang="en-US" sz="6400" dirty="0"/>
+          </a:p>
+          <a:p>
+            <a:r>
+              <a:rPr lang="en-US" sz="6400" dirty="0"/>
               <a:t>               (binary-search-loop lo (- </a:t>
             </a:r>
             <a:r>
-              <a:rPr lang="en-US" dirty="0" smtClean="0"/>
+              <a:rPr lang="en-US" sz="6400" dirty="0" smtClean="0"/>
               <a:t>p </a:t>
             </a:r>
             <a:r>
-              <a:rPr lang="en-US" dirty="0"/>
+              <a:rPr lang="en-US" sz="6400" dirty="0"/>
               <a:t>1) f </a:t>
             </a:r>
             <a:r>
-              <a:rPr lang="en-US" dirty="0" err="1"/>
+              <a:rPr lang="en-US" sz="6400" dirty="0" err="1"/>
               <a:t>tgt</a:t>
             </a:r>
             <a:r>
-              <a:rPr lang="en-US" dirty="0"/>
+              <a:rPr lang="en-US" sz="6400" dirty="0"/>
               <a:t>)]</a:t>
             </a:r>
           </a:p>
           <a:p>
             <a:r>
-              <a:rPr lang="en-US" dirty="0"/>
+              <a:rPr lang="en-US" sz="6400" dirty="0"/>
               <a:t>              [else </a:t>
             </a:r>
-          </a:p>
-          <a:p>
-            <a:r>
-              <a:rPr lang="en-US" dirty="0"/>
-              <a:t>                ;; </a:t>
-            </a:r>
-            <a:r>
-              <a:rPr lang="en-US" dirty="0" smtClean="0"/>
-              <a:t>p </a:t>
-            </a:r>
-            <a:r>
-              <a:rPr lang="en-US" dirty="0"/>
-              <a:t>is the one we're looking for</a:t>
-            </a:r>
-          </a:p>
-          <a:p>
-            <a:r>
-              <a:rPr lang="en-US" dirty="0"/>
-              <a:t>                </a:t>
-            </a:r>
-            <a:r>
-              <a:rPr lang="en-US" dirty="0" smtClean="0"/>
-              <a:t>p]))]))</a:t>
-            </a:r>
-            <a:endParaRPr lang="en-US" dirty="0"/>
+            <a:r>
+              <a:rPr lang="en-US" sz="6400" dirty="0" smtClean="0"/>
+              <a:t>p]))]))     ; </a:t>
+            </a:r>
+            <a:r>
+              <a:rPr lang="en-US" sz="6400" dirty="0"/>
+              <a:t>p is the one we're looking </a:t>
+            </a:r>
+            <a:r>
+              <a:rPr lang="en-US" sz="6400" dirty="0" smtClean="0"/>
+              <a:t>for </a:t>
+            </a:r>
+            <a:r>
+              <a:rPr lang="en-US" sz="6400" dirty="0" smtClean="0"/>
+              <a:t>                             </a:t>
+            </a:r>
+          </a:p>
+          <a:p>
+            <a:r>
+              <a:rPr lang="en-US" sz="6400" dirty="0"/>
+              <a:t> </a:t>
+            </a:r>
+            <a:r>
+              <a:rPr lang="en-US" sz="6400" dirty="0" smtClean="0"/>
+              <a:t>              </a:t>
+            </a:r>
+            <a:endParaRPr lang="en-US" sz="6400" dirty="0"/>
           </a:p>
         </p:txBody>
       </p:sp>
@@ -6073,11 +6147,7 @@
             </a:r>
             <a:r>
               <a:rPr lang="en-US" smtClean="0"/>
-              <a:t>hi              </a:t>
-            </a:r>
-            <a:r>
-              <a:rPr lang="en-US" smtClean="0"/>
-              <a:t> </a:t>
+              <a:t>hi               </a:t>
             </a:r>
             <a:r>
               <a:rPr lang="en-US" dirty="0" smtClean="0"/>
@@ -6088,15 +6158,7 @@
             <a:pPr lvl="2"/>
             <a:r>
               <a:rPr lang="en-US" dirty="0" smtClean="0"/>
-              <a:t>lo ≤ p ≤ hi    </a:t>
-            </a:r>
-            <a:r>
-              <a:rPr lang="en-US" dirty="0" smtClean="0"/>
-              <a:t>     [</a:t>
-            </a:r>
-            <a:r>
-              <a:rPr lang="en-US" dirty="0" smtClean="0"/>
-              <a:t>that’s how we chose p]</a:t>
+              <a:t>lo ≤ p ≤ hi         [that’s how we chose p]</a:t>
             </a:r>
           </a:p>
           <a:p>

</xml_diff>